<commit_message>
Lecture 9 in class files
</commit_message>
<xml_diff>
--- a/Lecture 8/lecture8.pptx
+++ b/Lecture 8/lecture8.pptx
@@ -6,10 +6,10 @@
     <p:sldMasterId id="2147483650" r:id="rId2"/>
   </p:sldMasterIdLst>
   <p:notesMasterIdLst>
-    <p:notesMasterId r:id="rId60"/>
+    <p:notesMasterId r:id="rId61"/>
   </p:notesMasterIdLst>
   <p:handoutMasterIdLst>
-    <p:handoutMasterId r:id="rId61"/>
+    <p:handoutMasterId r:id="rId62"/>
   </p:handoutMasterIdLst>
   <p:sldIdLst>
     <p:sldId id="309" r:id="rId3"/>
@@ -55,20 +55,21 @@
     <p:sldId id="434" r:id="rId43"/>
     <p:sldId id="528" r:id="rId44"/>
     <p:sldId id="525" r:id="rId45"/>
-    <p:sldId id="438" r:id="rId46"/>
-    <p:sldId id="475" r:id="rId47"/>
-    <p:sldId id="439" r:id="rId48"/>
-    <p:sldId id="441" r:id="rId49"/>
-    <p:sldId id="442" r:id="rId50"/>
-    <p:sldId id="446" r:id="rId51"/>
-    <p:sldId id="495" r:id="rId52"/>
-    <p:sldId id="448" r:id="rId53"/>
-    <p:sldId id="501" r:id="rId54"/>
-    <p:sldId id="526" r:id="rId55"/>
-    <p:sldId id="503" r:id="rId56"/>
-    <p:sldId id="522" r:id="rId57"/>
-    <p:sldId id="493" r:id="rId58"/>
-    <p:sldId id="490" r:id="rId59"/>
+    <p:sldId id="531" r:id="rId46"/>
+    <p:sldId id="438" r:id="rId47"/>
+    <p:sldId id="475" r:id="rId48"/>
+    <p:sldId id="439" r:id="rId49"/>
+    <p:sldId id="441" r:id="rId50"/>
+    <p:sldId id="442" r:id="rId51"/>
+    <p:sldId id="446" r:id="rId52"/>
+    <p:sldId id="495" r:id="rId53"/>
+    <p:sldId id="448" r:id="rId54"/>
+    <p:sldId id="501" r:id="rId55"/>
+    <p:sldId id="526" r:id="rId56"/>
+    <p:sldId id="503" r:id="rId57"/>
+    <p:sldId id="522" r:id="rId58"/>
+    <p:sldId id="493" r:id="rId59"/>
+    <p:sldId id="490" r:id="rId60"/>
   </p:sldIdLst>
   <p:sldSz cx="12192000" cy="6858000"/>
   <p:notesSz cx="6858000" cy="9144000"/>
@@ -3436,7 +3437,7 @@
           <a:graphicData uri="http://schemas.openxmlformats.org/presentationml/2006/ole">
             <mc:AlternateContent xmlns:mc="http://schemas.openxmlformats.org/markup-compatibility/2006">
               <mc:Choice xmlns:v="urn:schemas-microsoft-com:vml" Requires="v">
-                <p:oleObj spid="_x0000_s1029" name="Visio" r:id="rId4" imgW="4504467" imgH="1532790" progId="Visio.Drawing.11">
+                <p:oleObj spid="_x0000_s1030" name="Visio" r:id="rId4" imgW="4504467" imgH="1532790" progId="Visio.Drawing.11">
                   <p:embed/>
                 </p:oleObj>
               </mc:Choice>
@@ -9625,17 +9626,10 @@
                 <a:latin typeface="Courier New" panose="02070309020205020404" pitchFamily="49" charset="0"/>
                 <a:cs typeface="Courier New" panose="02070309020205020404" pitchFamily="49" charset="0"/>
               </a:rPr>
-              <a:t>);	/</a:t>
-            </a:r>
-            <a:r>
-              <a:rPr lang="en-US" sz="1600">
-                <a:latin typeface="Courier New" panose="02070309020205020404" pitchFamily="49" charset="0"/>
-                <a:cs typeface="Courier New" panose="02070309020205020404" pitchFamily="49" charset="0"/>
-              </a:rPr>
-              <a:t>/ </a:t>
-            </a:r>
-            <a:r>
-              <a:rPr lang="en-US" sz="1600" smtClean="0">
+              <a:t>);	// </a:t>
+            </a:r>
+            <a:r>
+              <a:rPr lang="en-US" sz="1600" dirty="0" smtClean="0">
                 <a:latin typeface="Courier New" panose="02070309020205020404" pitchFamily="49" charset="0"/>
                 <a:cs typeface="Courier New" panose="02070309020205020404" pitchFamily="49" charset="0"/>
               </a:rPr>
@@ -11097,7 +11091,7 @@
           <p:nvPr>
             <p:extLst>
               <p:ext uri="{D42A27DB-BD31-4B8C-83A1-F6EECF244321}">
-                <p14:modId xmlns:p14="http://schemas.microsoft.com/office/powerpoint/2010/main" val="2560248672"/>
+                <p14:modId xmlns:p14="http://schemas.microsoft.com/office/powerpoint/2010/main" val="2345325598"/>
               </p:ext>
             </p:extLst>
           </p:nvPr>
@@ -11488,7 +11482,19 @@
                           <a:ea typeface="+mn-ea"/>
                           <a:cs typeface="+mn-cs"/>
                         </a:rPr>
-                        <a:t>Adds a previously created HTML element node to the DOM.</a:t>
+                        <a:t>Adds a previously created HTML element node to the DOM</a:t>
+                      </a:r>
+                      <a:r>
+                        <a:rPr lang="en-US" sz="1400" b="0" i="0" kern="1200" dirty="0" smtClean="0">
+                          <a:solidFill>
+                            <a:schemeClr val="dk1"/>
+                          </a:solidFill>
+                          <a:effectLst/>
+                          <a:latin typeface="+mn-lt"/>
+                          <a:ea typeface="+mn-ea"/>
+                          <a:cs typeface="+mn-cs"/>
+                        </a:rPr>
+                        <a:t>. NODE INTERFACE</a:t>
                       </a:r>
                       <a:endParaRPr lang="en-US" sz="1400" dirty="0"/>
                     </a:p>
@@ -16348,9 +16354,10 @@
           <a:p>
             <a:pPr algn="ctr"/>
             <a:r>
-              <a:rPr lang="en-US" dirty="0"/>
-              <a:t>DOM HTML</a:t>
-            </a:r>
+              <a:rPr lang="en-US" dirty="0" smtClean="0"/>
+              <a:t>LAB 10</a:t>
+            </a:r>
+            <a:endParaRPr lang="en-US" dirty="0"/>
           </a:p>
         </p:txBody>
       </p:sp>
@@ -16386,7 +16393,7 @@
       </p:grpSpPr>
       <p:sp>
         <p:nvSpPr>
-          <p:cNvPr id="5" name="Title 4"/>
+          <p:cNvPr id="7" name="Title 6"/>
           <p:cNvSpPr>
             <a:spLocks noGrp="1"/>
           </p:cNvSpPr>
@@ -16394,134 +16401,20 @@
             <p:ph type="title"/>
           </p:nvPr>
         </p:nvSpPr>
-        <p:spPr/>
+        <p:spPr>
+          <a:xfrm>
+            <a:off x="1919536" y="3015930"/>
+            <a:ext cx="8352928" cy="826140"/>
+          </a:xfrm>
+        </p:spPr>
         <p:txBody>
           <a:bodyPr/>
           <a:lstStyle/>
           <a:p>
-            <a:r>
-              <a:rPr lang="en-US" dirty="0"/>
-              <a:t>DOM Scripting</a:t>
-            </a:r>
-            <a:endParaRPr lang="nl-NL" dirty="0"/>
-          </a:p>
-        </p:txBody>
-      </p:sp>
-      <p:sp>
-        <p:nvSpPr>
-          <p:cNvPr id="2" name="Text Placeholder 1"/>
-          <p:cNvSpPr>
-            <a:spLocks noGrp="1"/>
-          </p:cNvSpPr>
-          <p:nvPr>
-            <p:ph type="body" sz="quarter" idx="11"/>
-          </p:nvPr>
-        </p:nvSpPr>
-        <p:spPr/>
-        <p:txBody>
-          <a:bodyPr/>
-          <a:lstStyle/>
-          <a:p>
+            <a:pPr algn="ctr"/>
             <a:r>
               <a:rPr lang="en-US" dirty="0"/>
               <a:t>DOM HTML</a:t>
-            </a:r>
-          </a:p>
-        </p:txBody>
-      </p:sp>
-      <p:sp>
-        <p:nvSpPr>
-          <p:cNvPr id="8" name="Text Placeholder 6"/>
-          <p:cNvSpPr>
-            <a:spLocks noGrp="1"/>
-          </p:cNvSpPr>
-          <p:nvPr>
-            <p:ph type="body" sz="quarter" idx="14"/>
-          </p:nvPr>
-        </p:nvSpPr>
-        <p:spPr>
-          <a:xfrm>
-            <a:off x="335360" y="1628800"/>
-            <a:ext cx="11502854" cy="4679950"/>
-          </a:xfrm>
-        </p:spPr>
-        <p:txBody>
-          <a:bodyPr>
-            <a:noAutofit/>
-          </a:bodyPr>
-          <a:lstStyle/>
-          <a:p>
-            <a:r>
-              <a:rPr lang="en-US" sz="1600" dirty="0">
-                <a:cs typeface="Courier New" panose="02070309020205020404" pitchFamily="49" charset="0"/>
-              </a:rPr>
-              <a:t>The DOM HTML specification represents a standard object model and programming interface for HTML. It defines:</a:t>
-            </a:r>
-          </a:p>
-          <a:p>
-            <a:endParaRPr lang="en-US" sz="1600" dirty="0">
-              <a:cs typeface="Courier New" panose="02070309020205020404" pitchFamily="49" charset="0"/>
-            </a:endParaRPr>
-          </a:p>
-          <a:p>
-            <a:pPr marL="457200" indent="-457200">
-              <a:buFont typeface="Wingdings" panose="05000000000000000000" pitchFamily="2" charset="2"/>
-              <a:buChar char="v"/>
-            </a:pPr>
-            <a:r>
-              <a:rPr lang="en-US" sz="1600" dirty="0">
-                <a:cs typeface="Courier New" panose="02070309020205020404" pitchFamily="49" charset="0"/>
-              </a:rPr>
-              <a:t>The HTML elements as objects</a:t>
-            </a:r>
-          </a:p>
-          <a:p>
-            <a:pPr marL="457200" indent="-457200">
-              <a:buFont typeface="Wingdings" panose="05000000000000000000" pitchFamily="2" charset="2"/>
-              <a:buChar char="v"/>
-            </a:pPr>
-            <a:r>
-              <a:rPr lang="en-US" sz="1600" dirty="0">
-                <a:cs typeface="Courier New" panose="02070309020205020404" pitchFamily="49" charset="0"/>
-              </a:rPr>
-              <a:t>The properties of all HTML elements</a:t>
-            </a:r>
-          </a:p>
-          <a:p>
-            <a:pPr marL="457200" indent="-457200">
-              <a:buFont typeface="Wingdings" panose="05000000000000000000" pitchFamily="2" charset="2"/>
-              <a:buChar char="v"/>
-            </a:pPr>
-            <a:r>
-              <a:rPr lang="en-US" sz="1600" dirty="0">
-                <a:cs typeface="Courier New" panose="02070309020205020404" pitchFamily="49" charset="0"/>
-              </a:rPr>
-              <a:t>The methods to access all HTML elements</a:t>
-            </a:r>
-          </a:p>
-          <a:p>
-            <a:pPr marL="457200" indent="-457200">
-              <a:buFont typeface="Wingdings" panose="05000000000000000000" pitchFamily="2" charset="2"/>
-              <a:buChar char="v"/>
-            </a:pPr>
-            <a:r>
-              <a:rPr lang="en-US" sz="1600" dirty="0">
-                <a:cs typeface="Courier New" panose="02070309020205020404" pitchFamily="49" charset="0"/>
-              </a:rPr>
-              <a:t>The events for all HTML elements</a:t>
-            </a:r>
-          </a:p>
-          <a:p>
-            <a:endParaRPr lang="en-US" sz="1600" dirty="0">
-              <a:cs typeface="Courier New" panose="02070309020205020404" pitchFamily="49" charset="0"/>
-            </a:endParaRPr>
-          </a:p>
-          <a:p>
-            <a:r>
-              <a:rPr lang="en-US" sz="1600" dirty="0">
-                <a:cs typeface="Courier New" panose="02070309020205020404" pitchFamily="49" charset="0"/>
-              </a:rPr>
-              <a:t>In other words, the HTML DOM is a standard for getting, changing, adding, or deleting HTML elements in a simple way.</a:t>
             </a:r>
           </a:p>
         </p:txBody>
@@ -16529,7 +16422,7 @@
     </p:spTree>
     <p:extLst>
       <p:ext uri="{BB962C8B-B14F-4D97-AF65-F5344CB8AC3E}">
-        <p14:creationId xmlns:p14="http://schemas.microsoft.com/office/powerpoint/2010/main" val="4290844621"/>
+        <p14:creationId xmlns:p14="http://schemas.microsoft.com/office/powerpoint/2010/main" val="741974914"/>
       </p:ext>
     </p:extLst>
   </p:cSld>
@@ -16596,7 +16489,7 @@
           <a:p>
             <a:r>
               <a:rPr lang="en-US" dirty="0"/>
-              <a:t>The DOM HTML inheritance hierarchy</a:t>
+              <a:t>DOM HTML</a:t>
             </a:r>
           </a:p>
         </p:txBody>
@@ -16613,8 +16506,8 @@
         </p:nvSpPr>
         <p:spPr>
           <a:xfrm>
-            <a:off x="335359" y="1628800"/>
-            <a:ext cx="11511019" cy="4679950"/>
+            <a:off x="335360" y="1628800"/>
+            <a:ext cx="11502854" cy="4679950"/>
           </a:xfrm>
         </p:spPr>
         <p:txBody>
@@ -16627,151 +16520,81 @@
               <a:rPr lang="en-US" sz="1600" dirty="0">
                 <a:cs typeface="Courier New" panose="02070309020205020404" pitchFamily="49" charset="0"/>
               </a:rPr>
-              <a:t>The diagram below presents the inheritance hierarchy that shows that the </a:t>
-            </a:r>
-            <a:r>
-              <a:rPr lang="en-US" sz="1600" dirty="0" err="1">
-                <a:cs typeface="Courier New" panose="02070309020205020404" pitchFamily="49" charset="0"/>
-              </a:rPr>
-              <a:t>HTMLElement</a:t>
-            </a:r>
-            <a:r>
-              <a:rPr lang="en-US" sz="1600" dirty="0">
-                <a:cs typeface="Courier New" panose="02070309020205020404" pitchFamily="49" charset="0"/>
-              </a:rPr>
-              <a:t> interface inherits properties and methods from the Element and Node interfaces of the DOM Core specification. In turn, the </a:t>
-            </a:r>
-            <a:r>
-              <a:rPr lang="en-US" sz="1600" dirty="0" err="1">
-                <a:cs typeface="Courier New" panose="02070309020205020404" pitchFamily="49" charset="0"/>
-              </a:rPr>
-              <a:t>HTMLElement</a:t>
-            </a:r>
-            <a:r>
-              <a:rPr lang="en-US" sz="1600" dirty="0">
-                <a:cs typeface="Courier New" panose="02070309020205020404" pitchFamily="49" charset="0"/>
-              </a:rPr>
-              <a:t> type is the base type for several more elements such as the </a:t>
-            </a:r>
-            <a:r>
-              <a:rPr lang="en-US" sz="1600" dirty="0" err="1">
-                <a:cs typeface="Courier New" panose="02070309020205020404" pitchFamily="49" charset="0"/>
-              </a:rPr>
-              <a:t>HTMLAnchorElement</a:t>
-            </a:r>
-            <a:r>
-              <a:rPr lang="en-US" sz="1600" dirty="0">
-                <a:cs typeface="Courier New" panose="02070309020205020404" pitchFamily="49" charset="0"/>
-              </a:rPr>
-              <a:t>, </a:t>
-            </a:r>
-            <a:r>
-              <a:rPr lang="en-US" sz="1600" dirty="0" err="1">
-                <a:cs typeface="Courier New" panose="02070309020205020404" pitchFamily="49" charset="0"/>
-              </a:rPr>
-              <a:t>HTMLImageElement</a:t>
-            </a:r>
-            <a:r>
-              <a:rPr lang="en-US" sz="1600" dirty="0">
-                <a:cs typeface="Courier New" panose="02070309020205020404" pitchFamily="49" charset="0"/>
-              </a:rPr>
-              <a:t>, </a:t>
-            </a:r>
-            <a:r>
-              <a:rPr lang="en-US" sz="1600" dirty="0" err="1">
-                <a:cs typeface="Courier New" panose="02070309020205020404" pitchFamily="49" charset="0"/>
-              </a:rPr>
-              <a:t>HTMLButtonElement</a:t>
-            </a:r>
-            <a:r>
-              <a:rPr lang="en-US" sz="1600" dirty="0">
-                <a:cs typeface="Courier New" panose="02070309020205020404" pitchFamily="49" charset="0"/>
-              </a:rPr>
-              <a:t>, </a:t>
-            </a:r>
-            <a:r>
-              <a:rPr lang="en-US" sz="1600" dirty="0" err="1">
-                <a:cs typeface="Courier New" panose="02070309020205020404" pitchFamily="49" charset="0"/>
-              </a:rPr>
-              <a:t>HTMLInputElement</a:t>
-            </a:r>
-            <a:r>
-              <a:rPr lang="en-US" sz="1600" dirty="0">
-                <a:cs typeface="Courier New" panose="02070309020205020404" pitchFamily="49" charset="0"/>
-              </a:rPr>
-              <a:t>, and many more.</a:t>
+              <a:t>The DOM HTML specification represents a standard object model and programming interface for HTML. It defines:</a:t>
+            </a:r>
+          </a:p>
+          <a:p>
+            <a:endParaRPr lang="en-US" sz="1600" dirty="0">
+              <a:cs typeface="Courier New" panose="02070309020205020404" pitchFamily="49" charset="0"/>
+            </a:endParaRPr>
+          </a:p>
+          <a:p>
+            <a:pPr marL="457200" indent="-457200">
+              <a:buFont typeface="Wingdings" panose="05000000000000000000" pitchFamily="2" charset="2"/>
+              <a:buChar char="v"/>
+            </a:pPr>
+            <a:r>
+              <a:rPr lang="en-US" sz="1600" dirty="0">
+                <a:cs typeface="Courier New" panose="02070309020205020404" pitchFamily="49" charset="0"/>
+              </a:rPr>
+              <a:t>The HTML elements as objects</a:t>
+            </a:r>
+          </a:p>
+          <a:p>
+            <a:pPr marL="457200" indent="-457200">
+              <a:buFont typeface="Wingdings" panose="05000000000000000000" pitchFamily="2" charset="2"/>
+              <a:buChar char="v"/>
+            </a:pPr>
+            <a:r>
+              <a:rPr lang="en-US" sz="1600" dirty="0">
+                <a:cs typeface="Courier New" panose="02070309020205020404" pitchFamily="49" charset="0"/>
+              </a:rPr>
+              <a:t>The properties of all HTML elements</a:t>
+            </a:r>
+          </a:p>
+          <a:p>
+            <a:pPr marL="457200" indent="-457200">
+              <a:buFont typeface="Wingdings" panose="05000000000000000000" pitchFamily="2" charset="2"/>
+              <a:buChar char="v"/>
+            </a:pPr>
+            <a:r>
+              <a:rPr lang="en-US" sz="1600" dirty="0">
+                <a:cs typeface="Courier New" panose="02070309020205020404" pitchFamily="49" charset="0"/>
+              </a:rPr>
+              <a:t>The methods to access all HTML elements</a:t>
+            </a:r>
+          </a:p>
+          <a:p>
+            <a:pPr marL="457200" indent="-457200">
+              <a:buFont typeface="Wingdings" panose="05000000000000000000" pitchFamily="2" charset="2"/>
+              <a:buChar char="v"/>
+            </a:pPr>
+            <a:r>
+              <a:rPr lang="en-US" sz="1600" dirty="0">
+                <a:cs typeface="Courier New" panose="02070309020205020404" pitchFamily="49" charset="0"/>
+              </a:rPr>
+              <a:t>The events for all HTML elements</a:t>
+            </a:r>
+          </a:p>
+          <a:p>
+            <a:endParaRPr lang="en-US" sz="1600" dirty="0">
+              <a:cs typeface="Courier New" panose="02070309020205020404" pitchFamily="49" charset="0"/>
+            </a:endParaRPr>
+          </a:p>
+          <a:p>
+            <a:r>
+              <a:rPr lang="en-US" sz="1600" dirty="0">
+                <a:cs typeface="Courier New" panose="02070309020205020404" pitchFamily="49" charset="0"/>
+              </a:rPr>
+              <a:t>In other words, the HTML DOM is a standard for getting, changing, adding, or deleting HTML elements in a simple way.</a:t>
             </a:r>
           </a:p>
         </p:txBody>
       </p:sp>
-      <p:graphicFrame>
-        <p:nvGraphicFramePr>
-          <p:cNvPr id="7" name="Object 6"/>
-          <p:cNvGraphicFramePr>
-            <a:graphicFrameLocks noChangeAspect="1"/>
-          </p:cNvGraphicFramePr>
-          <p:nvPr>
-            <p:extLst>
-              <p:ext uri="{D42A27DB-BD31-4B8C-83A1-F6EECF244321}">
-                <p14:modId xmlns:p14="http://schemas.microsoft.com/office/powerpoint/2010/main" val="1407589419"/>
-              </p:ext>
-            </p:extLst>
-          </p:nvPr>
-        </p:nvGraphicFramePr>
-        <p:xfrm>
-          <a:off x="1847850" y="2961825"/>
-          <a:ext cx="9448800" cy="3752850"/>
-        </p:xfrm>
-        <a:graphic>
-          <a:graphicData uri="http://schemas.openxmlformats.org/presentationml/2006/ole">
-            <mc:AlternateContent xmlns:mc="http://schemas.openxmlformats.org/markup-compatibility/2006">
-              <mc:Choice xmlns:v="urn:schemas-microsoft-com:vml" Requires="v">
-                <p:oleObj spid="_x0000_s2053" name="Visio" r:id="rId3" imgW="6777906" imgH="2688390" progId="Visio.Drawing.11">
-                  <p:embed/>
-                </p:oleObj>
-              </mc:Choice>
-              <mc:Fallback>
-                <p:oleObj name="Visio" r:id="rId3" imgW="6777906" imgH="2688390" progId="Visio.Drawing.11">
-                  <p:embed/>
-                  <p:pic>
-                    <p:nvPicPr>
-                      <p:cNvPr id="0" name=""/>
-                      <p:cNvPicPr>
-                        <a:picLocks noChangeAspect="1" noChangeArrowheads="1"/>
-                      </p:cNvPicPr>
-                      <p:nvPr/>
-                    </p:nvPicPr>
-                    <p:blipFill>
-                      <a:blip r:embed="rId4"/>
-                      <a:srcRect/>
-                      <a:stretch>
-                        <a:fillRect/>
-                      </a:stretch>
-                    </p:blipFill>
-                    <p:spPr bwMode="auto">
-                      <a:xfrm>
-                        <a:off x="1847850" y="2961825"/>
-                        <a:ext cx="9448800" cy="3752850"/>
-                      </a:xfrm>
-                      <a:prstGeom prst="rect">
-                        <a:avLst/>
-                      </a:prstGeom>
-                      <a:noFill/>
-                      <a:ln>
-                        <a:noFill/>
-                      </a:ln>
-                    </p:spPr>
-                  </p:pic>
-                </p:oleObj>
-              </mc:Fallback>
-            </mc:AlternateContent>
-          </a:graphicData>
-        </a:graphic>
-      </p:graphicFrame>
     </p:spTree>
     <p:extLst>
       <p:ext uri="{BB962C8B-B14F-4D97-AF65-F5344CB8AC3E}">
-        <p14:creationId xmlns:p14="http://schemas.microsoft.com/office/powerpoint/2010/main" val="1214836253"/>
+        <p14:creationId xmlns:p14="http://schemas.microsoft.com/office/powerpoint/2010/main" val="4290844621"/>
       </p:ext>
     </p:extLst>
   </p:cSld>
@@ -16838,7 +16661,7 @@
           <a:p>
             <a:r>
               <a:rPr lang="en-US" dirty="0"/>
-              <a:t>DOM HTML Nodes</a:t>
+              <a:t>The DOM HTML inheritance hierarchy</a:t>
             </a:r>
           </a:p>
         </p:txBody>
@@ -16855,8 +16678,8 @@
         </p:nvSpPr>
         <p:spPr>
           <a:xfrm>
-            <a:off x="335360" y="1628800"/>
-            <a:ext cx="11502854" cy="4679950"/>
+            <a:off x="335359" y="1628800"/>
+            <a:ext cx="11511019" cy="4679950"/>
           </a:xfrm>
         </p:spPr>
         <p:txBody>
@@ -16865,132 +16688,187 @@
           </a:bodyPr>
           <a:lstStyle/>
           <a:p>
-            <a:pPr marL="461963" indent="-461963">
-              <a:buFont typeface="Wingdings" panose="05000000000000000000" pitchFamily="2" charset="2"/>
-              <a:buChar char="v"/>
-            </a:pPr>
-            <a:r>
-              <a:rPr lang="en-US" sz="1600" dirty="0"/>
-              <a:t>The properties of the </a:t>
-            </a:r>
-            <a:r>
-              <a:rPr lang="en-US" sz="1600" dirty="0" err="1"/>
+            <a:r>
+              <a:rPr lang="en-US" sz="1600" dirty="0">
+                <a:cs typeface="Courier New" panose="02070309020205020404" pitchFamily="49" charset="0"/>
+              </a:rPr>
+              <a:t>The diagram below presents the inheritance hierarchy that shows that the </a:t>
+            </a:r>
+            <a:r>
+              <a:rPr lang="en-US" sz="1600" dirty="0" err="1">
+                <a:cs typeface="Courier New" panose="02070309020205020404" pitchFamily="49" charset="0"/>
+              </a:rPr>
               <a:t>HTMLElement</a:t>
             </a:r>
             <a:r>
-              <a:rPr lang="en-US" sz="1600" dirty="0"/>
-              <a:t> interface don't provide new functionality, but they do provide shortcuts that make it easier to work with the DOM elements.</a:t>
-            </a:r>
-          </a:p>
-          <a:p>
-            <a:pPr marL="461963" indent="-461963">
-              <a:buFont typeface="Wingdings" panose="05000000000000000000" pitchFamily="2" charset="2"/>
-              <a:buChar char="v"/>
-            </a:pPr>
-            <a:r>
-              <a:rPr lang="en-US" sz="1600" dirty="0"/>
-              <a:t>The </a:t>
-            </a:r>
-            <a:r>
-              <a:rPr lang="en-US" sz="1600" dirty="0" err="1"/>
+              <a:rPr lang="en-US" sz="1600" dirty="0">
+                <a:cs typeface="Courier New" panose="02070309020205020404" pitchFamily="49" charset="0"/>
+              </a:rPr>
+              <a:t> interface inherits properties and methods from the Element and Node interfaces of the DOM Core specification. In turn, the </a:t>
+            </a:r>
+            <a:r>
+              <a:rPr lang="en-US" sz="1600" dirty="0" err="1">
+                <a:cs typeface="Courier New" panose="02070309020205020404" pitchFamily="49" charset="0"/>
+              </a:rPr>
               <a:t>HTMLElement</a:t>
             </a:r>
             <a:r>
-              <a:rPr lang="en-US" sz="1600" dirty="0"/>
-              <a:t> interface inherits the DOM Element interface. As a result, it provides access to all the properties and methods of the Node and Element interfaces.</a:t>
-            </a:r>
-          </a:p>
-          <a:p>
-            <a:pPr marL="461963" indent="-461963">
-              <a:buFont typeface="Wingdings" panose="05000000000000000000" pitchFamily="2" charset="2"/>
-              <a:buChar char="v"/>
-            </a:pPr>
-            <a:r>
-              <a:rPr lang="en-US" sz="1600" dirty="0"/>
-              <a:t>The </a:t>
-            </a:r>
-            <a:r>
-              <a:rPr lang="en-US" sz="1600" dirty="0" err="1"/>
-              <a:t>HTMLElement</a:t>
-            </a:r>
-            <a:r>
-              <a:rPr lang="en-US" sz="1600" dirty="0"/>
-              <a:t> interface is the base interface for other interfaces that correspond with HTML tags. For example, the </a:t>
-            </a:r>
-            <a:r>
-              <a:rPr lang="en-US" sz="1600" dirty="0" err="1"/>
+              <a:rPr lang="en-US" sz="1600" dirty="0">
+                <a:cs typeface="Courier New" panose="02070309020205020404" pitchFamily="49" charset="0"/>
+              </a:rPr>
+              <a:t> type is the base type for several more elements such as the </a:t>
+            </a:r>
+            <a:r>
+              <a:rPr lang="en-US" sz="1600" dirty="0" err="1">
+                <a:cs typeface="Courier New" panose="02070309020205020404" pitchFamily="49" charset="0"/>
+              </a:rPr>
               <a:t>HTMLAnchorElement</a:t>
             </a:r>
             <a:r>
-              <a:rPr lang="en-US" sz="1600" dirty="0"/>
-              <a:t> interface corresponds with the &lt;a&gt; tag, the </a:t>
-            </a:r>
-            <a:r>
-              <a:rPr lang="en-US" sz="1600" dirty="0" err="1"/>
+              <a:rPr lang="en-US" sz="1600" dirty="0">
+                <a:cs typeface="Courier New" panose="02070309020205020404" pitchFamily="49" charset="0"/>
+              </a:rPr>
+              <a:t>, </a:t>
+            </a:r>
+            <a:r>
+              <a:rPr lang="en-US" sz="1600" dirty="0" err="1">
+                <a:cs typeface="Courier New" panose="02070309020205020404" pitchFamily="49" charset="0"/>
+              </a:rPr>
               <a:t>HTMLImageElement</a:t>
             </a:r>
             <a:r>
-              <a:rPr lang="en-US" sz="1600" dirty="0"/>
-              <a:t> type corresponds with the &lt;</a:t>
-            </a:r>
-            <a:r>
-              <a:rPr lang="en-US" sz="1600" dirty="0" err="1"/>
-              <a:t>img</a:t>
-            </a:r>
-            <a:r>
-              <a:rPr lang="en-US" sz="1600" dirty="0"/>
-              <a:t>&gt; tag, etc. </a:t>
-            </a:r>
-          </a:p>
-          <a:p>
-            <a:endParaRPr lang="en-US" sz="1600" b="1" dirty="0"/>
-          </a:p>
-          <a:p>
-            <a:r>
-              <a:rPr lang="en-US" sz="1600" b="1" dirty="0"/>
-              <a:t>How to get an id using the DOM Core method</a:t>
-            </a:r>
-          </a:p>
-          <a:p>
+              <a:rPr lang="en-US" sz="1600" dirty="0">
+                <a:cs typeface="Courier New" panose="02070309020205020404" pitchFamily="49" charset="0"/>
+              </a:rPr>
+              <a:t>, </a:t>
+            </a:r>
             <a:r>
               <a:rPr lang="en-US" sz="1600" dirty="0" err="1">
-                <a:latin typeface="Courier New" panose="02070309020205020404" pitchFamily="49" charset="0"/>
-                <a:cs typeface="Courier New" panose="02070309020205020404" pitchFamily="49" charset="0"/>
-              </a:rPr>
-              <a:t>email.getAttribute</a:t>
-            </a:r>
-            <a:r>
-              <a:rPr lang="en-US" sz="1600" dirty="0">
-                <a:latin typeface="Courier New" panose="02070309020205020404" pitchFamily="49" charset="0"/>
-                <a:cs typeface="Courier New" panose="02070309020205020404" pitchFamily="49" charset="0"/>
-              </a:rPr>
-              <a:t>('id');</a:t>
-            </a:r>
-          </a:p>
-          <a:p>
-            <a:endParaRPr lang="en-US" sz="1600" b="1" dirty="0"/>
-          </a:p>
-          <a:p>
-            <a:r>
-              <a:rPr lang="en-US" sz="1600" b="1" dirty="0"/>
-              <a:t>How to get an id using the DOM HTML attribute</a:t>
-            </a:r>
-          </a:p>
-          <a:p>
-            <a:r>
-              <a:rPr lang="en-US" sz="1600" dirty="0">
-                <a:latin typeface="Courier New" panose="02070309020205020404" pitchFamily="49" charset="0"/>
-                <a:cs typeface="Courier New" panose="02070309020205020404" pitchFamily="49" charset="0"/>
-              </a:rPr>
-              <a:t>email.id;</a:t>
-            </a:r>
+                <a:cs typeface="Courier New" panose="02070309020205020404" pitchFamily="49" charset="0"/>
+              </a:rPr>
+              <a:t>HTMLButtonElement</a:t>
+            </a:r>
+            <a:r>
+              <a:rPr lang="en-US" sz="1600" dirty="0">
+                <a:cs typeface="Courier New" panose="02070309020205020404" pitchFamily="49" charset="0"/>
+              </a:rPr>
+              <a:t>, </a:t>
+            </a:r>
+            <a:r>
+              <a:rPr lang="en-US" sz="1600" dirty="0" err="1">
+                <a:cs typeface="Courier New" panose="02070309020205020404" pitchFamily="49" charset="0"/>
+              </a:rPr>
+              <a:t>HTMLInputElement</a:t>
+            </a:r>
+            <a:r>
+              <a:rPr lang="en-US" sz="1600" dirty="0">
+                <a:cs typeface="Courier New" panose="02070309020205020404" pitchFamily="49" charset="0"/>
+              </a:rPr>
+              <a:t>, and many more</a:t>
+            </a:r>
+            <a:r>
+              <a:rPr lang="en-US" sz="1600" dirty="0" smtClean="0">
+                <a:cs typeface="Courier New" panose="02070309020205020404" pitchFamily="49" charset="0"/>
+              </a:rPr>
+              <a:t>. </a:t>
+            </a:r>
+            <a:r>
+              <a:rPr lang="en-US" sz="1600" dirty="0" smtClean="0">
+                <a:solidFill>
+                  <a:srgbClr val="FFFF00"/>
+                </a:solidFill>
+                <a:cs typeface="Courier New" panose="02070309020205020404" pitchFamily="49" charset="0"/>
+              </a:rPr>
+              <a:t>Basically every HTML element has its own interface. But if you know all the attributes of HTML elements, you know how to access these</a:t>
+            </a:r>
+          </a:p>
+          <a:p>
+            <a:r>
+              <a:rPr lang="en-US" sz="1600" dirty="0" smtClean="0">
+                <a:solidFill>
+                  <a:srgbClr val="FFFF00"/>
+                </a:solidFill>
+                <a:cs typeface="Courier New" panose="02070309020205020404" pitchFamily="49" charset="0"/>
+              </a:rPr>
+              <a:t>interfaces</a:t>
+            </a:r>
+            <a:endParaRPr lang="en-US" sz="1600" dirty="0">
+              <a:solidFill>
+                <a:srgbClr val="FFFF00"/>
+              </a:solidFill>
+              <a:cs typeface="Courier New" panose="02070309020205020404" pitchFamily="49" charset="0"/>
+            </a:endParaRPr>
           </a:p>
         </p:txBody>
       </p:sp>
+      <p:graphicFrame>
+        <p:nvGraphicFramePr>
+          <p:cNvPr id="7" name="Object 6"/>
+          <p:cNvGraphicFramePr>
+            <a:graphicFrameLocks noChangeAspect="1"/>
+          </p:cNvGraphicFramePr>
+          <p:nvPr>
+            <p:extLst>
+              <p:ext uri="{D42A27DB-BD31-4B8C-83A1-F6EECF244321}">
+                <p14:modId xmlns:p14="http://schemas.microsoft.com/office/powerpoint/2010/main" val="1407589419"/>
+              </p:ext>
+            </p:extLst>
+          </p:nvPr>
+        </p:nvGraphicFramePr>
+        <p:xfrm>
+          <a:off x="1847850" y="2961825"/>
+          <a:ext cx="9448800" cy="3752850"/>
+        </p:xfrm>
+        <a:graphic>
+          <a:graphicData uri="http://schemas.openxmlformats.org/presentationml/2006/ole">
+            <mc:AlternateContent xmlns:mc="http://schemas.openxmlformats.org/markup-compatibility/2006">
+              <mc:Choice xmlns:v="urn:schemas-microsoft-com:vml" Requires="v">
+                <p:oleObj spid="_x0000_s2055" name="Visio" r:id="rId3" imgW="6777906" imgH="2688390" progId="Visio.Drawing.11">
+                  <p:embed/>
+                </p:oleObj>
+              </mc:Choice>
+              <mc:Fallback>
+                <p:oleObj name="Visio" r:id="rId3" imgW="6777906" imgH="2688390" progId="Visio.Drawing.11">
+                  <p:embed/>
+                  <p:pic>
+                    <p:nvPicPr>
+                      <p:cNvPr id="0" name=""/>
+                      <p:cNvPicPr>
+                        <a:picLocks noChangeAspect="1" noChangeArrowheads="1"/>
+                      </p:cNvPicPr>
+                      <p:nvPr/>
+                    </p:nvPicPr>
+                    <p:blipFill>
+                      <a:blip r:embed="rId4"/>
+                      <a:srcRect/>
+                      <a:stretch>
+                        <a:fillRect/>
+                      </a:stretch>
+                    </p:blipFill>
+                    <p:spPr bwMode="auto">
+                      <a:xfrm>
+                        <a:off x="1847850" y="2961825"/>
+                        <a:ext cx="9448800" cy="3752850"/>
+                      </a:xfrm>
+                      <a:prstGeom prst="rect">
+                        <a:avLst/>
+                      </a:prstGeom>
+                      <a:noFill/>
+                      <a:ln>
+                        <a:noFill/>
+                      </a:ln>
+                    </p:spPr>
+                  </p:pic>
+                </p:oleObj>
+              </mc:Fallback>
+            </mc:AlternateContent>
+          </a:graphicData>
+        </a:graphic>
+      </p:graphicFrame>
     </p:spTree>
     <p:extLst>
       <p:ext uri="{BB962C8B-B14F-4D97-AF65-F5344CB8AC3E}">
-        <p14:creationId xmlns:p14="http://schemas.microsoft.com/office/powerpoint/2010/main" val="1360379964"/>
+        <p14:creationId xmlns:p14="http://schemas.microsoft.com/office/powerpoint/2010/main" val="1214836253"/>
       </p:ext>
     </p:extLst>
   </p:cSld>
@@ -17057,7 +16935,7 @@
           <a:p>
             <a:r>
               <a:rPr lang="en-US" dirty="0"/>
-              <a:t>DOM HTML examples</a:t>
+              <a:t>DOM HTML Nodes</a:t>
             </a:r>
           </a:p>
         </p:txBody>
@@ -17075,7 +16953,7 @@
         <p:spPr>
           <a:xfrm>
             <a:off x="335360" y="1628800"/>
-            <a:ext cx="9649072" cy="4679950"/>
+            <a:ext cx="11502854" cy="4679950"/>
           </a:xfrm>
         </p:spPr>
         <p:txBody>
@@ -17084,75 +16962,106 @@
           </a:bodyPr>
           <a:lstStyle/>
           <a:p>
+            <a:pPr marL="461963" indent="-461963">
+              <a:buFont typeface="Wingdings" panose="05000000000000000000" pitchFamily="2" charset="2"/>
+              <a:buChar char="v"/>
+            </a:pPr>
+            <a:r>
+              <a:rPr lang="en-US" sz="1600" dirty="0"/>
+              <a:t>The properties of the </a:t>
+            </a:r>
+            <a:r>
+              <a:rPr lang="en-US" sz="1600" dirty="0" err="1"/>
+              <a:t>HTMLElement</a:t>
+            </a:r>
+            <a:r>
+              <a:rPr lang="en-US" sz="1600" dirty="0"/>
+              <a:t> interface don't provide new functionality, but they do provide shortcuts that make it easier to work with the DOM elements.</a:t>
+            </a:r>
+          </a:p>
+          <a:p>
+            <a:pPr marL="461963" indent="-461963">
+              <a:buFont typeface="Wingdings" panose="05000000000000000000" pitchFamily="2" charset="2"/>
+              <a:buChar char="v"/>
+            </a:pPr>
+            <a:r>
+              <a:rPr lang="en-US" sz="1600" dirty="0"/>
+              <a:t>The </a:t>
+            </a:r>
+            <a:r>
+              <a:rPr lang="en-US" sz="1600" dirty="0" err="1"/>
+              <a:t>HTMLElement</a:t>
+            </a:r>
+            <a:r>
+              <a:rPr lang="en-US" sz="1600" dirty="0"/>
+              <a:t> interface inherits the DOM Element interface. As a result, it provides access to all the properties and methods of the Node and Element interfaces.</a:t>
+            </a:r>
+          </a:p>
+          <a:p>
+            <a:pPr marL="461963" indent="-461963">
+              <a:buFont typeface="Wingdings" panose="05000000000000000000" pitchFamily="2" charset="2"/>
+              <a:buChar char="v"/>
+            </a:pPr>
+            <a:r>
+              <a:rPr lang="en-US" sz="1600" dirty="0"/>
+              <a:t>The </a:t>
+            </a:r>
+            <a:r>
+              <a:rPr lang="en-US" sz="1600" dirty="0" err="1"/>
+              <a:t>HTMLElement</a:t>
+            </a:r>
+            <a:r>
+              <a:rPr lang="en-US" sz="1600" dirty="0"/>
+              <a:t> interface is the base interface for other interfaces that correspond with HTML tags. For example, the </a:t>
+            </a:r>
+            <a:r>
+              <a:rPr lang="en-US" sz="1600" dirty="0" err="1"/>
+              <a:t>HTMLAnchorElement</a:t>
+            </a:r>
+            <a:r>
+              <a:rPr lang="en-US" sz="1600" dirty="0"/>
+              <a:t> interface corresponds with the &lt;a&gt; tag, the </a:t>
+            </a:r>
+            <a:r>
+              <a:rPr lang="en-US" sz="1600" dirty="0" err="1"/>
+              <a:t>HTMLImageElement</a:t>
+            </a:r>
+            <a:r>
+              <a:rPr lang="en-US" sz="1600" dirty="0"/>
+              <a:t> type corresponds with the &lt;</a:t>
+            </a:r>
+            <a:r>
+              <a:rPr lang="en-US" sz="1600" dirty="0" err="1"/>
+              <a:t>img</a:t>
+            </a:r>
+            <a:r>
+              <a:rPr lang="en-US" sz="1600" dirty="0"/>
+              <a:t>&gt; tag, etc. </a:t>
+            </a:r>
+          </a:p>
+          <a:p>
+            <a:endParaRPr lang="en-US" sz="1600" b="1" dirty="0"/>
+          </a:p>
+          <a:p>
             <a:r>
               <a:rPr lang="en-US" sz="1600" b="1" dirty="0"/>
-              <a:t>How to get the id of an image element</a:t>
-            </a:r>
-          </a:p>
-          <a:p>
-            <a:endParaRPr lang="en-US" sz="1600" b="1" dirty="0">
-              <a:latin typeface="Courier New" panose="02070309020205020404" pitchFamily="49" charset="0"/>
-              <a:cs typeface="Courier New" panose="02070309020205020404" pitchFamily="49" charset="0"/>
-            </a:endParaRPr>
-          </a:p>
-          <a:p>
-            <a:r>
-              <a:rPr lang="en-US" sz="1600" dirty="0">
-                <a:latin typeface="Courier New" panose="02070309020205020404" pitchFamily="49" charset="0"/>
-                <a:cs typeface="Courier New" panose="02070309020205020404" pitchFamily="49" charset="0"/>
-              </a:rPr>
-              <a:t>let images = </a:t>
-            </a:r>
+              <a:t>How to get an id using the DOM Core method</a:t>
+            </a:r>
+          </a:p>
+          <a:p>
             <a:r>
               <a:rPr lang="en-US" sz="1600" dirty="0" err="1">
                 <a:latin typeface="Courier New" panose="02070309020205020404" pitchFamily="49" charset="0"/>
                 <a:cs typeface="Courier New" panose="02070309020205020404" pitchFamily="49" charset="0"/>
               </a:rPr>
-              <a:t>document.getElementsByTagName</a:t>
-            </a:r>
-            <a:r>
-              <a:rPr lang="en-US" sz="1600" dirty="0">
-                <a:latin typeface="Courier New" panose="02070309020205020404" pitchFamily="49" charset="0"/>
-                <a:cs typeface="Courier New" panose="02070309020205020404" pitchFamily="49" charset="0"/>
-              </a:rPr>
-              <a:t>('</a:t>
-            </a:r>
-            <a:r>
-              <a:rPr lang="en-US" sz="1600" dirty="0" err="1">
-                <a:latin typeface="Courier New" panose="02070309020205020404" pitchFamily="49" charset="0"/>
-                <a:cs typeface="Courier New" panose="02070309020205020404" pitchFamily="49" charset="0"/>
-              </a:rPr>
-              <a:t>img</a:t>
-            </a:r>
-            <a:r>
-              <a:rPr lang="en-US" sz="1600" dirty="0">
-                <a:latin typeface="Courier New" panose="02070309020205020404" pitchFamily="49" charset="0"/>
-                <a:cs typeface="Courier New" panose="02070309020205020404" pitchFamily="49" charset="0"/>
-              </a:rPr>
-              <a:t>')</a:t>
-            </a:r>
-          </a:p>
-          <a:p>
-            <a:r>
-              <a:rPr lang="en-US" sz="1600" dirty="0">
-                <a:latin typeface="Courier New" panose="02070309020205020404" pitchFamily="49" charset="0"/>
-                <a:cs typeface="Courier New" panose="02070309020205020404" pitchFamily="49" charset="0"/>
-              </a:rPr>
-              <a:t>console.log(`First image id: ${images[0].</a:t>
-            </a:r>
-            <a:r>
-              <a:rPr lang="en-US" sz="1600" b="1" dirty="0">
-                <a:latin typeface="Courier New" panose="02070309020205020404" pitchFamily="49" charset="0"/>
-                <a:cs typeface="Courier New" panose="02070309020205020404" pitchFamily="49" charset="0"/>
-              </a:rPr>
-              <a:t>id}`</a:t>
-            </a:r>
-            <a:r>
-              <a:rPr lang="en-US" sz="1600" dirty="0">
-                <a:latin typeface="Courier New" panose="02070309020205020404" pitchFamily="49" charset="0"/>
-                <a:cs typeface="Courier New" panose="02070309020205020404" pitchFamily="49" charset="0"/>
-              </a:rPr>
-              <a:t>);</a:t>
+              <a:t>email.getAttribute</a:t>
+            </a:r>
+            <a:r>
+              <a:rPr lang="en-US" sz="1600" dirty="0">
+                <a:latin typeface="Courier New" panose="02070309020205020404" pitchFamily="49" charset="0"/>
+                <a:cs typeface="Courier New" panose="02070309020205020404" pitchFamily="49" charset="0"/>
+              </a:rPr>
+              <a:t>('id');</a:t>
             </a:r>
           </a:p>
           <a:p>
@@ -17161,82 +17070,16 @@
           <a:p>
             <a:r>
               <a:rPr lang="en-US" sz="1600" b="1" dirty="0"/>
-              <a:t>How to get and set the title attribute of an element</a:t>
-            </a:r>
-          </a:p>
-          <a:p>
-            <a:endParaRPr lang="en-US" sz="1600" b="1" dirty="0">
-              <a:latin typeface="Courier New" panose="02070309020205020404" pitchFamily="49" charset="0"/>
-              <a:cs typeface="Courier New" panose="02070309020205020404" pitchFamily="49" charset="0"/>
-            </a:endParaRPr>
-          </a:p>
-          <a:p>
-            <a:r>
-              <a:rPr lang="en-US" sz="1600" dirty="0">
-                <a:latin typeface="Courier New" panose="02070309020205020404" pitchFamily="49" charset="0"/>
-                <a:cs typeface="Courier New" panose="02070309020205020404" pitchFamily="49" charset="0"/>
-              </a:rPr>
-              <a:t>let links = </a:t>
-            </a:r>
-            <a:r>
-              <a:rPr lang="en-US" sz="1600" dirty="0" err="1">
-                <a:latin typeface="Courier New" panose="02070309020205020404" pitchFamily="49" charset="0"/>
-                <a:cs typeface="Courier New" panose="02070309020205020404" pitchFamily="49" charset="0"/>
-              </a:rPr>
-              <a:t>document.getElementsByTagName</a:t>
-            </a:r>
-            <a:r>
-              <a:rPr lang="en-US" sz="1600" dirty="0">
-                <a:latin typeface="Courier New" panose="02070309020205020404" pitchFamily="49" charset="0"/>
-                <a:cs typeface="Courier New" panose="02070309020205020404" pitchFamily="49" charset="0"/>
-              </a:rPr>
-              <a:t>('a');</a:t>
-            </a:r>
-          </a:p>
-          <a:p>
-            <a:r>
-              <a:rPr lang="en-US" sz="1600" dirty="0">
-                <a:latin typeface="Courier New" panose="02070309020205020404" pitchFamily="49" charset="0"/>
-                <a:cs typeface="Courier New" panose="02070309020205020404" pitchFamily="49" charset="0"/>
-              </a:rPr>
-              <a:t>console.log(`Second link title: ${links[1].</a:t>
-            </a:r>
-            <a:r>
-              <a:rPr lang="en-US" sz="1600" b="1" dirty="0">
-                <a:latin typeface="Courier New" panose="02070309020205020404" pitchFamily="49" charset="0"/>
-                <a:cs typeface="Courier New" panose="02070309020205020404" pitchFamily="49" charset="0"/>
-              </a:rPr>
-              <a:t>title}`</a:t>
-            </a:r>
-            <a:r>
-              <a:rPr lang="en-US" sz="1600" dirty="0">
-                <a:latin typeface="Courier New" panose="02070309020205020404" pitchFamily="49" charset="0"/>
-                <a:cs typeface="Courier New" panose="02070309020205020404" pitchFamily="49" charset="0"/>
-              </a:rPr>
-              <a:t>);</a:t>
-            </a:r>
-          </a:p>
-          <a:p>
-            <a:r>
-              <a:rPr lang="en-US" sz="1600" dirty="0">
-                <a:latin typeface="Courier New" panose="02070309020205020404" pitchFamily="49" charset="0"/>
-                <a:cs typeface="Courier New" panose="02070309020205020404" pitchFamily="49" charset="0"/>
-              </a:rPr>
-              <a:t>links[1].</a:t>
-            </a:r>
-            <a:r>
-              <a:rPr lang="en-US" sz="1600" b="1" dirty="0">
-                <a:latin typeface="Courier New" panose="02070309020205020404" pitchFamily="49" charset="0"/>
-                <a:cs typeface="Courier New" panose="02070309020205020404" pitchFamily="49" charset="0"/>
-              </a:rPr>
-              <a:t>title</a:t>
-            </a:r>
-            <a:r>
-              <a:rPr lang="en-US" sz="1600" dirty="0">
-                <a:latin typeface="Courier New" panose="02070309020205020404" pitchFamily="49" charset="0"/>
-                <a:cs typeface="Courier New" panose="02070309020205020404" pitchFamily="49" charset="0"/>
-              </a:rPr>
-              <a:t> = 'New Title';</a:t>
+              <a:t>How to get an id using the DOM HTML attribute</a:t>
+            </a:r>
+          </a:p>
+          <a:p>
+            <a:r>
+              <a:rPr lang="en-US" sz="1600" dirty="0">
+                <a:latin typeface="Courier New" panose="02070309020205020404" pitchFamily="49" charset="0"/>
+                <a:cs typeface="Courier New" panose="02070309020205020404" pitchFamily="49" charset="0"/>
+              </a:rPr>
+              <a:t>email.id;</a:t>
             </a:r>
           </a:p>
         </p:txBody>
@@ -17244,7 +17087,7 @@
     </p:spTree>
     <p:extLst>
       <p:ext uri="{BB962C8B-B14F-4D97-AF65-F5344CB8AC3E}">
-        <p14:creationId xmlns:p14="http://schemas.microsoft.com/office/powerpoint/2010/main" val="116328777"/>
+        <p14:creationId xmlns:p14="http://schemas.microsoft.com/office/powerpoint/2010/main" val="1360379964"/>
       </p:ext>
     </p:extLst>
   </p:cSld>
@@ -17328,8 +17171,8 @@
         </p:nvSpPr>
         <p:spPr>
           <a:xfrm>
-            <a:off x="335359" y="1628800"/>
-            <a:ext cx="11511019" cy="4679950"/>
+            <a:off x="335360" y="1628800"/>
+            <a:ext cx="9649072" cy="4679950"/>
           </a:xfrm>
         </p:spPr>
         <p:txBody>
@@ -17340,15 +17183,7 @@
           <a:p>
             <a:r>
               <a:rPr lang="en-US" sz="1600" b="1" dirty="0"/>
-              <a:t>How to get the </a:t>
-            </a:r>
-            <a:r>
-              <a:rPr lang="en-US" sz="1600" b="1" dirty="0" err="1"/>
-              <a:t>href</a:t>
-            </a:r>
-            <a:r>
-              <a:rPr lang="en-US" sz="1600" b="1" dirty="0"/>
-              <a:t> attribute of an anchor element</a:t>
+              <a:t>How to get the id of an image element</a:t>
             </a:r>
           </a:p>
           <a:p>
@@ -17363,7 +17198,7 @@
                 <a:latin typeface="Courier New" panose="02070309020205020404" pitchFamily="49" charset="0"/>
                 <a:cs typeface="Courier New" panose="02070309020205020404" pitchFamily="49" charset="0"/>
               </a:rPr>
-              <a:t>let links = </a:t>
+              <a:t>let images = </a:t>
             </a:r>
             <a:r>
               <a:rPr lang="en-US" sz="1600" dirty="0" err="1">
@@ -17377,44 +17212,37 @@
                 <a:latin typeface="Courier New" panose="02070309020205020404" pitchFamily="49" charset="0"/>
                 <a:cs typeface="Courier New" panose="02070309020205020404" pitchFamily="49" charset="0"/>
               </a:rPr>
-              <a:t>('a');</a:t>
-            </a:r>
-          </a:p>
-          <a:p>
-            <a:r>
-              <a:rPr lang="en-US" sz="1600" dirty="0">
-                <a:latin typeface="Courier New" panose="02070309020205020404" pitchFamily="49" charset="0"/>
-                <a:cs typeface="Courier New" panose="02070309020205020404" pitchFamily="49" charset="0"/>
-              </a:rPr>
-              <a:t>console.log(`Second link </a:t>
+              <a:t>('</a:t>
             </a:r>
             <a:r>
               <a:rPr lang="en-US" sz="1600" dirty="0" err="1">
                 <a:latin typeface="Courier New" panose="02070309020205020404" pitchFamily="49" charset="0"/>
                 <a:cs typeface="Courier New" panose="02070309020205020404" pitchFamily="49" charset="0"/>
               </a:rPr>
-              <a:t>href</a:t>
-            </a:r>
-            <a:r>
-              <a:rPr lang="en-US" sz="1600" dirty="0">
-                <a:latin typeface="Courier New" panose="02070309020205020404" pitchFamily="49" charset="0"/>
-                <a:cs typeface="Courier New" panose="02070309020205020404" pitchFamily="49" charset="0"/>
-              </a:rPr>
-              <a:t>: ${links[1].</a:t>
-            </a:r>
-            <a:r>
-              <a:rPr lang="en-US" sz="1600" b="1" dirty="0" err="1">
-                <a:latin typeface="Courier New" panose="02070309020205020404" pitchFamily="49" charset="0"/>
-                <a:cs typeface="Courier New" panose="02070309020205020404" pitchFamily="49" charset="0"/>
-              </a:rPr>
-              <a:t>href</a:t>
+              <a:t>img</a:t>
+            </a:r>
+            <a:r>
+              <a:rPr lang="en-US" sz="1600" dirty="0">
+                <a:latin typeface="Courier New" panose="02070309020205020404" pitchFamily="49" charset="0"/>
+                <a:cs typeface="Courier New" panose="02070309020205020404" pitchFamily="49" charset="0"/>
+              </a:rPr>
+              <a:t>')</a:t>
+            </a:r>
+          </a:p>
+          <a:p>
+            <a:r>
+              <a:rPr lang="en-US" sz="1600" dirty="0">
+                <a:latin typeface="Courier New" panose="02070309020205020404" pitchFamily="49" charset="0"/>
+                <a:cs typeface="Courier New" panose="02070309020205020404" pitchFamily="49" charset="0"/>
+              </a:rPr>
+              <a:t>console.log(`First image id: ${images[0].</a:t>
             </a:r>
             <a:r>
               <a:rPr lang="en-US" sz="1600" b="1" dirty="0">
                 <a:latin typeface="Courier New" panose="02070309020205020404" pitchFamily="49" charset="0"/>
                 <a:cs typeface="Courier New" panose="02070309020205020404" pitchFamily="49" charset="0"/>
               </a:rPr>
-              <a:t>}`</a:t>
+              <a:t>id}`</a:t>
             </a:r>
             <a:r>
               <a:rPr lang="en-US" sz="1600" dirty="0">
@@ -17422,6 +17250,15 @@
                 <a:cs typeface="Courier New" panose="02070309020205020404" pitchFamily="49" charset="0"/>
               </a:rPr>
               <a:t>);</a:t>
+            </a:r>
+          </a:p>
+          <a:p>
+            <a:endParaRPr lang="en-US" sz="1600" b="1" dirty="0"/>
+          </a:p>
+          <a:p>
+            <a:r>
+              <a:rPr lang="en-US" sz="1600" b="1" dirty="0"/>
+              <a:t>How to get and set the title attribute of an element</a:t>
             </a:r>
           </a:p>
           <a:p>
@@ -17432,103 +17269,41 @@
           </a:p>
           <a:p>
             <a:r>
-              <a:rPr lang="en-US" sz="1600" b="1" dirty="0"/>
-              <a:t>How to get or set the </a:t>
-            </a:r>
-            <a:r>
-              <a:rPr lang="en-US" sz="1600" b="1" dirty="0" err="1"/>
-              <a:t>src</a:t>
-            </a:r>
-            <a:r>
-              <a:rPr lang="en-US" sz="1600" b="1" dirty="0"/>
-              <a:t> attribute of an image element</a:t>
-            </a:r>
-          </a:p>
-          <a:p>
-            <a:endParaRPr lang="en-US" sz="1600" b="1" dirty="0">
-              <a:latin typeface="Courier New" panose="02070309020205020404" pitchFamily="49" charset="0"/>
-              <a:cs typeface="Courier New" panose="02070309020205020404" pitchFamily="49" charset="0"/>
-            </a:endParaRPr>
-          </a:p>
-          <a:p>
-            <a:r>
-              <a:rPr lang="en-US" sz="1600" dirty="0">
-                <a:latin typeface="Courier New" panose="02070309020205020404" pitchFamily="49" charset="0"/>
-                <a:cs typeface="Courier New" panose="02070309020205020404" pitchFamily="49" charset="0"/>
-              </a:rPr>
-              <a:t>let </a:t>
+              <a:rPr lang="en-US" sz="1600" dirty="0">
+                <a:latin typeface="Courier New" panose="02070309020205020404" pitchFamily="49" charset="0"/>
+                <a:cs typeface="Courier New" panose="02070309020205020404" pitchFamily="49" charset="0"/>
+              </a:rPr>
+              <a:t>let links = </a:t>
             </a:r>
             <a:r>
               <a:rPr lang="en-US" sz="1600" dirty="0" err="1">
                 <a:latin typeface="Courier New" panose="02070309020205020404" pitchFamily="49" charset="0"/>
                 <a:cs typeface="Courier New" panose="02070309020205020404" pitchFamily="49" charset="0"/>
               </a:rPr>
-              <a:t>imageElement</a:t>
-            </a:r>
-            <a:r>
-              <a:rPr lang="en-US" sz="1600" dirty="0">
-                <a:latin typeface="Courier New" panose="02070309020205020404" pitchFamily="49" charset="0"/>
-                <a:cs typeface="Courier New" panose="02070309020205020404" pitchFamily="49" charset="0"/>
-              </a:rPr>
-              <a:t> = </a:t>
-            </a:r>
-            <a:r>
-              <a:rPr lang="en-US" sz="1600" dirty="0" err="1">
-                <a:latin typeface="Courier New" panose="02070309020205020404" pitchFamily="49" charset="0"/>
-                <a:cs typeface="Courier New" panose="02070309020205020404" pitchFamily="49" charset="0"/>
-              </a:rPr>
-              <a:t>document.getElementById</a:t>
-            </a:r>
-            <a:r>
-              <a:rPr lang="en-US" sz="1600" dirty="0">
-                <a:latin typeface="Courier New" panose="02070309020205020404" pitchFamily="49" charset="0"/>
-                <a:cs typeface="Courier New" panose="02070309020205020404" pitchFamily="49" charset="0"/>
-              </a:rPr>
-              <a:t>('image');</a:t>
-            </a:r>
-          </a:p>
-          <a:p>
-            <a:r>
-              <a:rPr lang="en-US" sz="1600" dirty="0">
-                <a:latin typeface="Courier New" panose="02070309020205020404" pitchFamily="49" charset="0"/>
-                <a:cs typeface="Courier New" panose="02070309020205020404" pitchFamily="49" charset="0"/>
-              </a:rPr>
-              <a:t>console.log(`Image element </a:t>
-            </a:r>
-            <a:r>
-              <a:rPr lang="en-US" sz="1600" dirty="0" err="1">
-                <a:latin typeface="Courier New" panose="02070309020205020404" pitchFamily="49" charset="0"/>
-                <a:cs typeface="Courier New" panose="02070309020205020404" pitchFamily="49" charset="0"/>
-              </a:rPr>
-              <a:t>src</a:t>
-            </a:r>
-            <a:r>
-              <a:rPr lang="en-US" sz="1600" dirty="0">
-                <a:latin typeface="Courier New" panose="02070309020205020404" pitchFamily="49" charset="0"/>
-                <a:cs typeface="Courier New" panose="02070309020205020404" pitchFamily="49" charset="0"/>
-              </a:rPr>
-              <a:t>: ${</a:t>
-            </a:r>
-            <a:r>
-              <a:rPr lang="en-US" sz="1600" dirty="0" err="1">
-                <a:latin typeface="Courier New" panose="02070309020205020404" pitchFamily="49" charset="0"/>
-                <a:cs typeface="Courier New" panose="02070309020205020404" pitchFamily="49" charset="0"/>
-              </a:rPr>
-              <a:t>imageElement.</a:t>
-            </a:r>
-            <a:r>
-              <a:rPr lang="en-US" sz="1600" b="1" dirty="0" err="1">
-                <a:latin typeface="Courier New" panose="02070309020205020404" pitchFamily="49" charset="0"/>
-                <a:cs typeface="Courier New" panose="02070309020205020404" pitchFamily="49" charset="0"/>
-              </a:rPr>
-              <a:t>src</a:t>
+              <a:t>document.getElementsByTagName</a:t>
+            </a:r>
+            <a:r>
+              <a:rPr lang="en-US" sz="1600" dirty="0">
+                <a:latin typeface="Courier New" panose="02070309020205020404" pitchFamily="49" charset="0"/>
+                <a:cs typeface="Courier New" panose="02070309020205020404" pitchFamily="49" charset="0"/>
+              </a:rPr>
+              <a:t>('a');</a:t>
+            </a:r>
+          </a:p>
+          <a:p>
+            <a:r>
+              <a:rPr lang="en-US" sz="1600" dirty="0">
+                <a:latin typeface="Courier New" panose="02070309020205020404" pitchFamily="49" charset="0"/>
+                <a:cs typeface="Courier New" panose="02070309020205020404" pitchFamily="49" charset="0"/>
+              </a:rPr>
+              <a:t>console.log(`Second link title: ${links[1].</a:t>
             </a:r>
             <a:r>
               <a:rPr lang="en-US" sz="1600" b="1" dirty="0">
                 <a:latin typeface="Courier New" panose="02070309020205020404" pitchFamily="49" charset="0"/>
                 <a:cs typeface="Courier New" panose="02070309020205020404" pitchFamily="49" charset="0"/>
               </a:rPr>
-              <a:t>}`</a:t>
+              <a:t>title}`</a:t>
             </a:r>
             <a:r>
               <a:rPr lang="en-US" sz="1600" dirty="0">
@@ -17540,41 +17315,33 @@
           </a:p>
           <a:p>
             <a:r>
-              <a:rPr lang="en-US" sz="1600" dirty="0" err="1">
-                <a:latin typeface="Courier New" panose="02070309020205020404" pitchFamily="49" charset="0"/>
-                <a:cs typeface="Courier New" panose="02070309020205020404" pitchFamily="49" charset="0"/>
-              </a:rPr>
-              <a:t>imageElement.</a:t>
-            </a:r>
-            <a:r>
-              <a:rPr lang="en-US" sz="1600" b="1" dirty="0" err="1">
-                <a:latin typeface="Courier New" panose="02070309020205020404" pitchFamily="49" charset="0"/>
-                <a:cs typeface="Courier New" panose="02070309020205020404" pitchFamily="49" charset="0"/>
-              </a:rPr>
-              <a:t>src</a:t>
-            </a:r>
-            <a:r>
-              <a:rPr lang="en-US" sz="1600" dirty="0">
-                <a:latin typeface="Courier New" panose="02070309020205020404" pitchFamily="49" charset="0"/>
-                <a:cs typeface="Courier New" panose="02070309020205020404" pitchFamily="49" charset="0"/>
-              </a:rPr>
-              <a:t> = 'building1.jpg';</a:t>
-            </a:r>
-            <a:endParaRPr lang="en-US" sz="1600" b="1" dirty="0">
-              <a:cs typeface="Courier New" panose="02070309020205020404" pitchFamily="49" charset="0"/>
-            </a:endParaRPr>
-          </a:p>
-          <a:p>
-            <a:endParaRPr lang="en-US" sz="1600" b="1" dirty="0">
-              <a:cs typeface="Courier New" panose="02070309020205020404" pitchFamily="49" charset="0"/>
-            </a:endParaRPr>
+              <a:rPr lang="en-US" sz="1600" dirty="0">
+                <a:latin typeface="Courier New" panose="02070309020205020404" pitchFamily="49" charset="0"/>
+                <a:cs typeface="Courier New" panose="02070309020205020404" pitchFamily="49" charset="0"/>
+              </a:rPr>
+              <a:t>links[1].</a:t>
+            </a:r>
+            <a:r>
+              <a:rPr lang="en-US" sz="1600" b="1" dirty="0">
+                <a:latin typeface="Courier New" panose="02070309020205020404" pitchFamily="49" charset="0"/>
+                <a:cs typeface="Courier New" panose="02070309020205020404" pitchFamily="49" charset="0"/>
+              </a:rPr>
+              <a:t>title</a:t>
+            </a:r>
+            <a:r>
+              <a:rPr lang="en-US" sz="1600" dirty="0">
+                <a:latin typeface="Courier New" panose="02070309020205020404" pitchFamily="49" charset="0"/>
+                <a:cs typeface="Courier New" panose="02070309020205020404" pitchFamily="49" charset="0"/>
+              </a:rPr>
+              <a:t> = 'New Title';</a:t>
+            </a:r>
           </a:p>
         </p:txBody>
       </p:sp>
     </p:spTree>
     <p:extLst>
       <p:ext uri="{BB962C8B-B14F-4D97-AF65-F5344CB8AC3E}">
-        <p14:creationId xmlns:p14="http://schemas.microsoft.com/office/powerpoint/2010/main" val="476293061"/>
+        <p14:creationId xmlns:p14="http://schemas.microsoft.com/office/powerpoint/2010/main" val="116328777"/>
       </p:ext>
     </p:extLst>
   </p:cSld>
@@ -17641,13 +17408,8 @@
           <a:p>
             <a:r>
               <a:rPr lang="en-US" dirty="0"/>
-              <a:t>DOM HTML examples: Text box and </a:t>
-            </a:r>
-            <a:r>
-              <a:rPr lang="en-US" dirty="0" err="1"/>
-              <a:t>Textarea</a:t>
-            </a:r>
-            <a:endParaRPr lang="en-US" dirty="0"/>
+              <a:t>DOM HTML examples</a:t>
+            </a:r>
           </a:p>
         </p:txBody>
       </p:sp>
@@ -17663,8 +17425,8 @@
         </p:nvSpPr>
         <p:spPr>
           <a:xfrm>
-            <a:off x="335360" y="1628800"/>
-            <a:ext cx="11494690" cy="4679950"/>
+            <a:off x="335359" y="1628800"/>
+            <a:ext cx="11511019" cy="4679950"/>
           </a:xfrm>
         </p:spPr>
         <p:txBody>
@@ -17674,10 +17436,16 @@
           <a:lstStyle/>
           <a:p>
             <a:r>
-              <a:rPr lang="en-US" sz="1600" b="1" dirty="0">
-                <a:cs typeface="Courier New" panose="02070309020205020404" pitchFamily="49" charset="0"/>
-              </a:rPr>
-              <a:t>Retrieving the value of a text box</a:t>
+              <a:rPr lang="en-US" sz="1600" b="1" dirty="0"/>
+              <a:t>How to get the </a:t>
+            </a:r>
+            <a:r>
+              <a:rPr lang="en-US" sz="1600" b="1" dirty="0" err="1"/>
+              <a:t>href</a:t>
+            </a:r>
+            <a:r>
+              <a:rPr lang="en-US" sz="1600" b="1" dirty="0"/>
+              <a:t> attribute of an anchor element</a:t>
             </a:r>
           </a:p>
           <a:p>
@@ -17692,58 +17460,58 @@
                 <a:latin typeface="Courier New" panose="02070309020205020404" pitchFamily="49" charset="0"/>
                 <a:cs typeface="Courier New" panose="02070309020205020404" pitchFamily="49" charset="0"/>
               </a:rPr>
-              <a:t>let box = </a:t>
+              <a:t>let links = </a:t>
             </a:r>
             <a:r>
               <a:rPr lang="en-US" sz="1600" dirty="0" err="1">
                 <a:latin typeface="Courier New" panose="02070309020205020404" pitchFamily="49" charset="0"/>
                 <a:cs typeface="Courier New" panose="02070309020205020404" pitchFamily="49" charset="0"/>
               </a:rPr>
-              <a:t>document.getElementById</a:t>
-            </a:r>
-            <a:r>
-              <a:rPr lang="en-US" sz="1600" dirty="0">
-                <a:latin typeface="Courier New" panose="02070309020205020404" pitchFamily="49" charset="0"/>
-                <a:cs typeface="Courier New" panose="02070309020205020404" pitchFamily="49" charset="0"/>
-              </a:rPr>
-              <a:t>('</a:t>
+              <a:t>document.getElementsByTagName</a:t>
+            </a:r>
+            <a:r>
+              <a:rPr lang="en-US" sz="1600" dirty="0">
+                <a:latin typeface="Courier New" panose="02070309020205020404" pitchFamily="49" charset="0"/>
+                <a:cs typeface="Courier New" panose="02070309020205020404" pitchFamily="49" charset="0"/>
+              </a:rPr>
+              <a:t>('a');</a:t>
+            </a:r>
+          </a:p>
+          <a:p>
+            <a:r>
+              <a:rPr lang="en-US" sz="1600" dirty="0">
+                <a:latin typeface="Courier New" panose="02070309020205020404" pitchFamily="49" charset="0"/>
+                <a:cs typeface="Courier New" panose="02070309020205020404" pitchFamily="49" charset="0"/>
+              </a:rPr>
+              <a:t>console.log(`Second link </a:t>
             </a:r>
             <a:r>
               <a:rPr lang="en-US" sz="1600" dirty="0" err="1">
                 <a:latin typeface="Courier New" panose="02070309020205020404" pitchFamily="49" charset="0"/>
                 <a:cs typeface="Courier New" panose="02070309020205020404" pitchFamily="49" charset="0"/>
               </a:rPr>
-              <a:t>firstname</a:t>
-            </a:r>
-            <a:r>
-              <a:rPr lang="en-US" sz="1600" dirty="0">
-                <a:latin typeface="Courier New" panose="02070309020205020404" pitchFamily="49" charset="0"/>
-                <a:cs typeface="Courier New" panose="02070309020205020404" pitchFamily="49" charset="0"/>
-              </a:rPr>
-              <a:t>');</a:t>
-            </a:r>
-          </a:p>
-          <a:p>
-            <a:r>
-              <a:rPr lang="en-US" sz="1600" dirty="0">
-                <a:latin typeface="Courier New" panose="02070309020205020404" pitchFamily="49" charset="0"/>
-                <a:cs typeface="Courier New" panose="02070309020205020404" pitchFamily="49" charset="0"/>
-              </a:rPr>
-              <a:t>console.log(</a:t>
-            </a:r>
-            <a:r>
-              <a:rPr lang="en-US" sz="1600" dirty="0" err="1">
-                <a:latin typeface="Courier New" panose="02070309020205020404" pitchFamily="49" charset="0"/>
-                <a:cs typeface="Courier New" panose="02070309020205020404" pitchFamily="49" charset="0"/>
-              </a:rPr>
-              <a:t>box.</a:t>
+              <a:t>href</a:t>
+            </a:r>
+            <a:r>
+              <a:rPr lang="en-US" sz="1600" dirty="0">
+                <a:latin typeface="Courier New" panose="02070309020205020404" pitchFamily="49" charset="0"/>
+                <a:cs typeface="Courier New" panose="02070309020205020404" pitchFamily="49" charset="0"/>
+              </a:rPr>
+              <a:t>: ${links[1].</a:t>
             </a:r>
             <a:r>
               <a:rPr lang="en-US" sz="1600" b="1" dirty="0" err="1">
                 <a:latin typeface="Courier New" panose="02070309020205020404" pitchFamily="49" charset="0"/>
                 <a:cs typeface="Courier New" panose="02070309020205020404" pitchFamily="49" charset="0"/>
               </a:rPr>
-              <a:t>value</a:t>
+              <a:t>href</a:t>
+            </a:r>
+            <a:r>
+              <a:rPr lang="en-US" sz="1600" b="1" dirty="0">
+                <a:latin typeface="Courier New" panose="02070309020205020404" pitchFamily="49" charset="0"/>
+                <a:cs typeface="Courier New" panose="02070309020205020404" pitchFamily="49" charset="0"/>
+              </a:rPr>
+              <a:t>}`</a:t>
             </a:r>
             <a:r>
               <a:rPr lang="en-US" sz="1600" dirty="0">
@@ -17751,57 +17519,6 @@
                 <a:cs typeface="Courier New" panose="02070309020205020404" pitchFamily="49" charset="0"/>
               </a:rPr>
               <a:t>);</a:t>
-            </a:r>
-          </a:p>
-          <a:p>
-            <a:r>
-              <a:rPr lang="en-US" sz="1600" dirty="0">
-                <a:latin typeface="Courier New" panose="02070309020205020404" pitchFamily="49" charset="0"/>
-                <a:cs typeface="Courier New" panose="02070309020205020404" pitchFamily="49" charset="0"/>
-              </a:rPr>
-              <a:t>// </a:t>
-            </a:r>
-            <a:r>
-              <a:rPr lang="en-US" sz="1600" dirty="0" err="1">
-                <a:latin typeface="Courier New" panose="02070309020205020404" pitchFamily="49" charset="0"/>
-                <a:cs typeface="Courier New" panose="02070309020205020404" pitchFamily="49" charset="0"/>
-              </a:rPr>
-              <a:t>document.getElementById</a:t>
-            </a:r>
-            <a:r>
-              <a:rPr lang="en-US" sz="1600" dirty="0">
-                <a:latin typeface="Courier New" panose="02070309020205020404" pitchFamily="49" charset="0"/>
-                <a:cs typeface="Courier New" panose="02070309020205020404" pitchFamily="49" charset="0"/>
-              </a:rPr>
-              <a:t>('</a:t>
-            </a:r>
-            <a:r>
-              <a:rPr lang="en-US" sz="1600" dirty="0" err="1">
-                <a:latin typeface="Courier New" panose="02070309020205020404" pitchFamily="49" charset="0"/>
-                <a:cs typeface="Courier New" panose="02070309020205020404" pitchFamily="49" charset="0"/>
-              </a:rPr>
-              <a:t>firstname</a:t>
-            </a:r>
-            <a:r>
-              <a:rPr lang="en-US" sz="1600" dirty="0">
-                <a:latin typeface="Courier New" panose="02070309020205020404" pitchFamily="49" charset="0"/>
-                <a:cs typeface="Courier New" panose="02070309020205020404" pitchFamily="49" charset="0"/>
-              </a:rPr>
-              <a:t>').value;			// Alternate method</a:t>
-            </a:r>
-          </a:p>
-          <a:p>
-            <a:endParaRPr lang="en-US" sz="1600" dirty="0">
-              <a:latin typeface="Courier New" panose="02070309020205020404" pitchFamily="49" charset="0"/>
-              <a:cs typeface="Courier New" panose="02070309020205020404" pitchFamily="49" charset="0"/>
-            </a:endParaRPr>
-          </a:p>
-          <a:p>
-            <a:r>
-              <a:rPr lang="en-US" sz="1600" b="1" dirty="0">
-                <a:cs typeface="Courier New" panose="02070309020205020404" pitchFamily="49" charset="0"/>
-              </a:rPr>
-              <a:t>Setting the value of a text box</a:t>
             </a:r>
           </a:p>
           <a:p>
@@ -17812,17 +17529,51 @@
           </a:p>
           <a:p>
             <a:r>
-              <a:rPr lang="en-US" sz="1600" dirty="0">
-                <a:latin typeface="Courier New" panose="02070309020205020404" pitchFamily="49" charset="0"/>
-                <a:cs typeface="Courier New" panose="02070309020205020404" pitchFamily="49" charset="0"/>
-              </a:rPr>
-              <a:t>let search = </a:t>
+              <a:rPr lang="en-US" sz="1600" b="1" dirty="0"/>
+              <a:t>How to get or set the </a:t>
+            </a:r>
+            <a:r>
+              <a:rPr lang="en-US" sz="1600" b="1" dirty="0" err="1"/>
+              <a:t>src</a:t>
+            </a:r>
+            <a:r>
+              <a:rPr lang="en-US" sz="1600" b="1" dirty="0"/>
+              <a:t> attribute of an image element</a:t>
+            </a:r>
+          </a:p>
+          <a:p>
+            <a:endParaRPr lang="en-US" sz="1600" b="1" dirty="0">
+              <a:latin typeface="Courier New" panose="02070309020205020404" pitchFamily="49" charset="0"/>
+              <a:cs typeface="Courier New" panose="02070309020205020404" pitchFamily="49" charset="0"/>
+            </a:endParaRPr>
+          </a:p>
+          <a:p>
+            <a:r>
+              <a:rPr lang="en-US" sz="1600" dirty="0">
+                <a:latin typeface="Courier New" panose="02070309020205020404" pitchFamily="49" charset="0"/>
+                <a:cs typeface="Courier New" panose="02070309020205020404" pitchFamily="49" charset="0"/>
+              </a:rPr>
+              <a:t>let </a:t>
             </a:r>
             <a:r>
               <a:rPr lang="en-US" sz="1600" dirty="0" err="1">
                 <a:latin typeface="Courier New" panose="02070309020205020404" pitchFamily="49" charset="0"/>
                 <a:cs typeface="Courier New" panose="02070309020205020404" pitchFamily="49" charset="0"/>
               </a:rPr>
+              <a:t>imageElement</a:t>
+            </a:r>
+            <a:r>
+              <a:rPr lang="en-US" sz="1600" dirty="0">
+                <a:latin typeface="Courier New" panose="02070309020205020404" pitchFamily="49" charset="0"/>
+                <a:cs typeface="Courier New" panose="02070309020205020404" pitchFamily="49" charset="0"/>
+              </a:rPr>
+              <a:t> = </a:t>
+            </a:r>
+            <a:r>
+              <a:rPr lang="en-US" sz="1600" dirty="0" err="1">
+                <a:latin typeface="Courier New" panose="02070309020205020404" pitchFamily="49" charset="0"/>
+                <a:cs typeface="Courier New" panose="02070309020205020404" pitchFamily="49" charset="0"/>
+              </a:rPr>
               <a:t>document.getElementById</a:t>
             </a:r>
             <a:r>
@@ -17830,68 +17581,97 @@
                 <a:latin typeface="Courier New" panose="02070309020205020404" pitchFamily="49" charset="0"/>
                 <a:cs typeface="Courier New" panose="02070309020205020404" pitchFamily="49" charset="0"/>
               </a:rPr>
-              <a:t>('search');</a:t>
-            </a:r>
-          </a:p>
-          <a:p>
+              <a:t>('image');</a:t>
+            </a:r>
+          </a:p>
+          <a:p>
+            <a:r>
+              <a:rPr lang="en-US" sz="1600" dirty="0">
+                <a:latin typeface="Courier New" panose="02070309020205020404" pitchFamily="49" charset="0"/>
+                <a:cs typeface="Courier New" panose="02070309020205020404" pitchFamily="49" charset="0"/>
+              </a:rPr>
+              <a:t>console.log(`Image element </a:t>
+            </a:r>
             <a:r>
               <a:rPr lang="en-US" sz="1600" dirty="0" err="1">
                 <a:latin typeface="Courier New" panose="02070309020205020404" pitchFamily="49" charset="0"/>
                 <a:cs typeface="Courier New" panose="02070309020205020404" pitchFamily="49" charset="0"/>
               </a:rPr>
-              <a:t>search.</a:t>
+              <a:t>src</a:t>
+            </a:r>
+            <a:r>
+              <a:rPr lang="en-US" sz="1600" dirty="0">
+                <a:latin typeface="Courier New" panose="02070309020205020404" pitchFamily="49" charset="0"/>
+                <a:cs typeface="Courier New" panose="02070309020205020404" pitchFamily="49" charset="0"/>
+              </a:rPr>
+              <a:t>: ${</a:t>
+            </a:r>
+            <a:r>
+              <a:rPr lang="en-US" sz="1600" dirty="0" err="1">
+                <a:latin typeface="Courier New" panose="02070309020205020404" pitchFamily="49" charset="0"/>
+                <a:cs typeface="Courier New" panose="02070309020205020404" pitchFamily="49" charset="0"/>
+              </a:rPr>
+              <a:t>imageElement.</a:t>
             </a:r>
             <a:r>
               <a:rPr lang="en-US" sz="1600" b="1" dirty="0" err="1">
                 <a:latin typeface="Courier New" panose="02070309020205020404" pitchFamily="49" charset="0"/>
                 <a:cs typeface="Courier New" panose="02070309020205020404" pitchFamily="49" charset="0"/>
               </a:rPr>
-              <a:t>value</a:t>
+              <a:t>src</a:t>
             </a:r>
             <a:r>
               <a:rPr lang="en-US" sz="1600" b="1" dirty="0">
                 <a:latin typeface="Courier New" panose="02070309020205020404" pitchFamily="49" charset="0"/>
                 <a:cs typeface="Courier New" panose="02070309020205020404" pitchFamily="49" charset="0"/>
               </a:rPr>
-              <a:t> = 'Enter search term'</a:t>
-            </a:r>
-            <a:r>
-              <a:rPr lang="en-US" sz="1600" dirty="0">
-                <a:latin typeface="Courier New" panose="02070309020205020404" pitchFamily="49" charset="0"/>
-                <a:cs typeface="Courier New" panose="02070309020205020404" pitchFamily="49" charset="0"/>
-              </a:rPr>
-              <a:t>;</a:t>
-            </a:r>
-          </a:p>
-          <a:p>
-            <a:r>
-              <a:rPr lang="en-US" sz="1600" dirty="0">
-                <a:latin typeface="Courier New" panose="02070309020205020404" pitchFamily="49" charset="0"/>
-                <a:cs typeface="Courier New" panose="02070309020205020404" pitchFamily="49" charset="0"/>
-              </a:rPr>
-              <a:t>// </a:t>
-            </a:r>
+              <a:t>}`</a:t>
+            </a:r>
+            <a:r>
+              <a:rPr lang="en-US" sz="1600" dirty="0">
+                <a:latin typeface="Courier New" panose="02070309020205020404" pitchFamily="49" charset="0"/>
+                <a:cs typeface="Courier New" panose="02070309020205020404" pitchFamily="49" charset="0"/>
+              </a:rPr>
+              <a:t>);</a:t>
+            </a:r>
+          </a:p>
+          <a:p>
             <a:r>
               <a:rPr lang="en-US" sz="1600" dirty="0" err="1">
                 <a:latin typeface="Courier New" panose="02070309020205020404" pitchFamily="49" charset="0"/>
                 <a:cs typeface="Courier New" panose="02070309020205020404" pitchFamily="49" charset="0"/>
               </a:rPr>
-              <a:t>document.getElementById</a:t>
-            </a:r>
-            <a:r>
-              <a:rPr lang="en-US" sz="1600" dirty="0">
-                <a:latin typeface="Courier New" panose="02070309020205020404" pitchFamily="49" charset="0"/>
-                <a:cs typeface="Courier New" panose="02070309020205020404" pitchFamily="49" charset="0"/>
-              </a:rPr>
-              <a:t>('search').value = 'Enter search term';	// Alternate method</a:t>
-            </a:r>
+              <a:t>imageElement.</a:t>
+            </a:r>
+            <a:r>
+              <a:rPr lang="en-US" sz="1600" b="1" dirty="0" err="1">
+                <a:latin typeface="Courier New" panose="02070309020205020404" pitchFamily="49" charset="0"/>
+                <a:cs typeface="Courier New" panose="02070309020205020404" pitchFamily="49" charset="0"/>
+              </a:rPr>
+              <a:t>src</a:t>
+            </a:r>
+            <a:r>
+              <a:rPr lang="en-US" sz="1600" dirty="0">
+                <a:latin typeface="Courier New" panose="02070309020205020404" pitchFamily="49" charset="0"/>
+                <a:cs typeface="Courier New" panose="02070309020205020404" pitchFamily="49" charset="0"/>
+              </a:rPr>
+              <a:t> = 'building1.jpg';</a:t>
+            </a:r>
+            <a:endParaRPr lang="en-US" sz="1600" b="1" dirty="0">
+              <a:cs typeface="Courier New" panose="02070309020205020404" pitchFamily="49" charset="0"/>
+            </a:endParaRPr>
+          </a:p>
+          <a:p>
+            <a:endParaRPr lang="en-US" sz="1600" b="1" dirty="0">
+              <a:cs typeface="Courier New" panose="02070309020205020404" pitchFamily="49" charset="0"/>
+            </a:endParaRPr>
           </a:p>
         </p:txBody>
       </p:sp>
     </p:spTree>
     <p:extLst>
       <p:ext uri="{BB962C8B-B14F-4D97-AF65-F5344CB8AC3E}">
-        <p14:creationId xmlns:p14="http://schemas.microsoft.com/office/powerpoint/2010/main" val="2469471083"/>
+        <p14:creationId xmlns:p14="http://schemas.microsoft.com/office/powerpoint/2010/main" val="476293061"/>
       </p:ext>
     </p:extLst>
   </p:cSld>
@@ -18165,8 +17945,13 @@
           <a:p>
             <a:r>
               <a:rPr lang="en-US" dirty="0"/>
-              <a:t>DOM HTML examples: Button</a:t>
-            </a:r>
+              <a:t>DOM HTML examples: Text box and </a:t>
+            </a:r>
+            <a:r>
+              <a:rPr lang="en-US" dirty="0" err="1"/>
+              <a:t>Textarea</a:t>
+            </a:r>
+            <a:endParaRPr lang="en-US" dirty="0"/>
           </a:p>
         </p:txBody>
       </p:sp>
@@ -18193,8 +17978,10 @@
           <a:lstStyle/>
           <a:p>
             <a:r>
-              <a:rPr lang="en-US" sz="1600" b="1" dirty="0"/>
-              <a:t>How to enable or disable a button</a:t>
+              <a:rPr lang="en-US" sz="1600" b="1" dirty="0">
+                <a:cs typeface="Courier New" panose="02070309020205020404" pitchFamily="49" charset="0"/>
+              </a:rPr>
+              <a:t>Retrieving the value of a text box</a:t>
             </a:r>
           </a:p>
           <a:p>
@@ -18209,27 +17996,80 @@
                 <a:latin typeface="Courier New" panose="02070309020205020404" pitchFamily="49" charset="0"/>
                 <a:cs typeface="Courier New" panose="02070309020205020404" pitchFamily="49" charset="0"/>
               </a:rPr>
-              <a:t>let </a:t>
+              <a:t>let box = </a:t>
             </a:r>
             <a:r>
               <a:rPr lang="en-US" sz="1600" dirty="0" err="1">
                 <a:latin typeface="Courier New" panose="02070309020205020404" pitchFamily="49" charset="0"/>
                 <a:cs typeface="Courier New" panose="02070309020205020404" pitchFamily="49" charset="0"/>
               </a:rPr>
-              <a:t>btnPlay</a:t>
-            </a:r>
-            <a:r>
-              <a:rPr lang="en-US" sz="1600" dirty="0">
-                <a:latin typeface="Courier New" panose="02070309020205020404" pitchFamily="49" charset="0"/>
-                <a:cs typeface="Courier New" panose="02070309020205020404" pitchFamily="49" charset="0"/>
-              </a:rPr>
-              <a:t> = </a:t>
+              <a:t>document.getElementById</a:t>
+            </a:r>
+            <a:r>
+              <a:rPr lang="en-US" sz="1600" dirty="0">
+                <a:latin typeface="Courier New" panose="02070309020205020404" pitchFamily="49" charset="0"/>
+                <a:cs typeface="Courier New" panose="02070309020205020404" pitchFamily="49" charset="0"/>
+              </a:rPr>
+              <a:t>('</a:t>
             </a:r>
             <a:r>
               <a:rPr lang="en-US" sz="1600" dirty="0" err="1">
                 <a:latin typeface="Courier New" panose="02070309020205020404" pitchFamily="49" charset="0"/>
                 <a:cs typeface="Courier New" panose="02070309020205020404" pitchFamily="49" charset="0"/>
               </a:rPr>
+              <a:t>firstname</a:t>
+            </a:r>
+            <a:r>
+              <a:rPr lang="en-US" sz="1600" dirty="0">
+                <a:latin typeface="Courier New" panose="02070309020205020404" pitchFamily="49" charset="0"/>
+                <a:cs typeface="Courier New" panose="02070309020205020404" pitchFamily="49" charset="0"/>
+              </a:rPr>
+              <a:t>');</a:t>
+            </a:r>
+          </a:p>
+          <a:p>
+            <a:r>
+              <a:rPr lang="en-US" sz="1600" dirty="0">
+                <a:latin typeface="Courier New" panose="02070309020205020404" pitchFamily="49" charset="0"/>
+                <a:cs typeface="Courier New" panose="02070309020205020404" pitchFamily="49" charset="0"/>
+              </a:rPr>
+              <a:t>console.log(</a:t>
+            </a:r>
+            <a:r>
+              <a:rPr lang="en-US" sz="1600" dirty="0" err="1">
+                <a:latin typeface="Courier New" panose="02070309020205020404" pitchFamily="49" charset="0"/>
+                <a:cs typeface="Courier New" panose="02070309020205020404" pitchFamily="49" charset="0"/>
+              </a:rPr>
+              <a:t>box.</a:t>
+            </a:r>
+            <a:r>
+              <a:rPr lang="en-US" sz="1600" b="1" dirty="0" err="1">
+                <a:latin typeface="Courier New" panose="02070309020205020404" pitchFamily="49" charset="0"/>
+                <a:cs typeface="Courier New" panose="02070309020205020404" pitchFamily="49" charset="0"/>
+              </a:rPr>
+              <a:t>value</a:t>
+            </a:r>
+            <a:r>
+              <a:rPr lang="en-US" sz="1600" dirty="0">
+                <a:latin typeface="Courier New" panose="02070309020205020404" pitchFamily="49" charset="0"/>
+                <a:cs typeface="Courier New" panose="02070309020205020404" pitchFamily="49" charset="0"/>
+              </a:rPr>
+              <a:t>);</a:t>
+            </a:r>
+          </a:p>
+          <a:p>
+            <a:r>
+              <a:rPr lang="en-US" sz="1600" dirty="0">
+                <a:latin typeface="Courier New" panose="02070309020205020404" pitchFamily="49" charset="0"/>
+                <a:cs typeface="Courier New" panose="02070309020205020404" pitchFamily="49" charset="0"/>
+              </a:rPr>
+              <a:t>// </a:t>
+            </a:r>
+            <a:r>
+              <a:rPr lang="en-US" sz="1600" dirty="0" err="1">
+                <a:latin typeface="Courier New" panose="02070309020205020404" pitchFamily="49" charset="0"/>
+                <a:cs typeface="Courier New" panose="02070309020205020404" pitchFamily="49" charset="0"/>
+              </a:rPr>
               <a:t>document.getElementById</a:t>
             </a:r>
             <a:r>
@@ -18244,120 +18084,28 @@
                 <a:latin typeface="Courier New" panose="02070309020205020404" pitchFamily="49" charset="0"/>
                 <a:cs typeface="Courier New" panose="02070309020205020404" pitchFamily="49" charset="0"/>
               </a:rPr>
-              <a:t>btnPlay</a:t>
-            </a:r>
-            <a:r>
-              <a:rPr lang="en-US" sz="1600" dirty="0">
-                <a:latin typeface="Courier New" panose="02070309020205020404" pitchFamily="49" charset="0"/>
-                <a:cs typeface="Courier New" panose="02070309020205020404" pitchFamily="49" charset="0"/>
-              </a:rPr>
-              <a:t>');</a:t>
-            </a:r>
-          </a:p>
-          <a:p>
-            <a:r>
-              <a:rPr lang="en-US" sz="1600" dirty="0">
-                <a:latin typeface="Courier New" panose="02070309020205020404" pitchFamily="49" charset="0"/>
-                <a:cs typeface="Courier New" panose="02070309020205020404" pitchFamily="49" charset="0"/>
-              </a:rPr>
-              <a:t>let </a:t>
-            </a:r>
-            <a:r>
-              <a:rPr lang="en-US" sz="1600" dirty="0" err="1">
-                <a:latin typeface="Courier New" panose="02070309020205020404" pitchFamily="49" charset="0"/>
-                <a:cs typeface="Courier New" panose="02070309020205020404" pitchFamily="49" charset="0"/>
-              </a:rPr>
-              <a:t>btnPause</a:t>
-            </a:r>
-            <a:r>
-              <a:rPr lang="en-US" sz="1600" dirty="0">
-                <a:latin typeface="Courier New" panose="02070309020205020404" pitchFamily="49" charset="0"/>
-                <a:cs typeface="Courier New" panose="02070309020205020404" pitchFamily="49" charset="0"/>
-              </a:rPr>
-              <a:t> = </a:t>
-            </a:r>
-            <a:r>
-              <a:rPr lang="en-US" sz="1600" dirty="0" err="1">
-                <a:latin typeface="Courier New" panose="02070309020205020404" pitchFamily="49" charset="0"/>
-                <a:cs typeface="Courier New" panose="02070309020205020404" pitchFamily="49" charset="0"/>
-              </a:rPr>
-              <a:t>document.getElementById</a:t>
-            </a:r>
-            <a:r>
-              <a:rPr lang="en-US" sz="1600" dirty="0">
-                <a:latin typeface="Courier New" panose="02070309020205020404" pitchFamily="49" charset="0"/>
-                <a:cs typeface="Courier New" panose="02070309020205020404" pitchFamily="49" charset="0"/>
-              </a:rPr>
-              <a:t>('</a:t>
-            </a:r>
-            <a:r>
-              <a:rPr lang="en-US" sz="1600" dirty="0" err="1">
-                <a:latin typeface="Courier New" panose="02070309020205020404" pitchFamily="49" charset="0"/>
-                <a:cs typeface="Courier New" panose="02070309020205020404" pitchFamily="49" charset="0"/>
-              </a:rPr>
-              <a:t>btnPause</a:t>
-            </a:r>
-            <a:r>
-              <a:rPr lang="en-US" sz="1600" dirty="0">
-                <a:latin typeface="Courier New" panose="02070309020205020404" pitchFamily="49" charset="0"/>
-                <a:cs typeface="Courier New" panose="02070309020205020404" pitchFamily="49" charset="0"/>
-              </a:rPr>
-              <a:t>');</a:t>
-            </a:r>
-          </a:p>
-          <a:p>
-            <a:r>
-              <a:rPr lang="en-US" sz="1600" dirty="0" err="1">
-                <a:latin typeface="Courier New" panose="02070309020205020404" pitchFamily="49" charset="0"/>
-                <a:cs typeface="Courier New" panose="02070309020205020404" pitchFamily="49" charset="0"/>
-              </a:rPr>
-              <a:t>btnPlay.</a:t>
-            </a:r>
-            <a:r>
-              <a:rPr lang="en-US" sz="1600" b="1" dirty="0" err="1">
-                <a:latin typeface="Courier New" panose="02070309020205020404" pitchFamily="49" charset="0"/>
-                <a:cs typeface="Courier New" panose="02070309020205020404" pitchFamily="49" charset="0"/>
-              </a:rPr>
-              <a:t>disabled</a:t>
-            </a:r>
-            <a:r>
-              <a:rPr lang="en-US" sz="1600" dirty="0">
-                <a:latin typeface="Courier New" panose="02070309020205020404" pitchFamily="49" charset="0"/>
-                <a:cs typeface="Courier New" panose="02070309020205020404" pitchFamily="49" charset="0"/>
-              </a:rPr>
-              <a:t> = true;</a:t>
-            </a:r>
-          </a:p>
-          <a:p>
-            <a:r>
-              <a:rPr lang="en-US" sz="1600" dirty="0" err="1">
-                <a:latin typeface="Courier New" panose="02070309020205020404" pitchFamily="49" charset="0"/>
-                <a:cs typeface="Courier New" panose="02070309020205020404" pitchFamily="49" charset="0"/>
-              </a:rPr>
-              <a:t>btnPause.</a:t>
-            </a:r>
-            <a:r>
-              <a:rPr lang="en-US" sz="1600" b="1" dirty="0" err="1">
-                <a:latin typeface="Courier New" panose="02070309020205020404" pitchFamily="49" charset="0"/>
-                <a:cs typeface="Courier New" panose="02070309020205020404" pitchFamily="49" charset="0"/>
-              </a:rPr>
-              <a:t>disabled</a:t>
-            </a:r>
-            <a:r>
-              <a:rPr lang="en-US" sz="1600" dirty="0">
-                <a:latin typeface="Courier New" panose="02070309020205020404" pitchFamily="49" charset="0"/>
-                <a:cs typeface="Courier New" panose="02070309020205020404" pitchFamily="49" charset="0"/>
-              </a:rPr>
-              <a:t> = false;</a:t>
-            </a:r>
-          </a:p>
-          <a:p>
-            <a:endParaRPr lang="en-US" sz="1600" dirty="0"/>
-          </a:p>
-          <a:p>
-            <a:r>
-              <a:rPr lang="en-US" sz="1600" b="1" dirty="0"/>
-              <a:t>How to toggle a button's disabled property</a:t>
+              <a:t>firstname</a:t>
+            </a:r>
+            <a:r>
+              <a:rPr lang="en-US" sz="1600" dirty="0">
+                <a:latin typeface="Courier New" panose="02070309020205020404" pitchFamily="49" charset="0"/>
+                <a:cs typeface="Courier New" panose="02070309020205020404" pitchFamily="49" charset="0"/>
+              </a:rPr>
+              <a:t>').value;			// Alternate method</a:t>
+            </a:r>
+          </a:p>
+          <a:p>
+            <a:endParaRPr lang="en-US" sz="1600" dirty="0">
+              <a:latin typeface="Courier New" panose="02070309020205020404" pitchFamily="49" charset="0"/>
+              <a:cs typeface="Courier New" panose="02070309020205020404" pitchFamily="49" charset="0"/>
+            </a:endParaRPr>
+          </a:p>
+          <a:p>
+            <a:r>
+              <a:rPr lang="en-US" sz="1600" b="1" dirty="0">
+                <a:cs typeface="Courier New" panose="02070309020205020404" pitchFamily="49" charset="0"/>
+              </a:rPr>
+              <a:t>Setting the value of a text box</a:t>
             </a:r>
           </a:p>
           <a:p>
@@ -18372,27 +18120,66 @@
                 <a:latin typeface="Courier New" panose="02070309020205020404" pitchFamily="49" charset="0"/>
                 <a:cs typeface="Courier New" panose="02070309020205020404" pitchFamily="49" charset="0"/>
               </a:rPr>
-              <a:t>let </a:t>
+              <a:t>let search = </a:t>
             </a:r>
             <a:r>
               <a:rPr lang="en-US" sz="1600" dirty="0" err="1">
                 <a:latin typeface="Courier New" panose="02070309020205020404" pitchFamily="49" charset="0"/>
                 <a:cs typeface="Courier New" panose="02070309020205020404" pitchFamily="49" charset="0"/>
               </a:rPr>
-              <a:t>btnPlay</a:t>
-            </a:r>
-            <a:r>
-              <a:rPr lang="en-US" sz="1600" dirty="0">
-                <a:latin typeface="Courier New" panose="02070309020205020404" pitchFamily="49" charset="0"/>
-                <a:cs typeface="Courier New" panose="02070309020205020404" pitchFamily="49" charset="0"/>
-              </a:rPr>
-              <a:t> = </a:t>
-            </a:r>
+              <a:t>document.getElementById</a:t>
+            </a:r>
+            <a:r>
+              <a:rPr lang="en-US" sz="1600" dirty="0">
+                <a:latin typeface="Courier New" panose="02070309020205020404" pitchFamily="49" charset="0"/>
+                <a:cs typeface="Courier New" panose="02070309020205020404" pitchFamily="49" charset="0"/>
+              </a:rPr>
+              <a:t>('search');</a:t>
+            </a:r>
+          </a:p>
+          <a:p>
             <a:r>
               <a:rPr lang="en-US" sz="1600" dirty="0" err="1">
                 <a:latin typeface="Courier New" panose="02070309020205020404" pitchFamily="49" charset="0"/>
                 <a:cs typeface="Courier New" panose="02070309020205020404" pitchFamily="49" charset="0"/>
               </a:rPr>
+              <a:t>search.</a:t>
+            </a:r>
+            <a:r>
+              <a:rPr lang="en-US" sz="1600" b="1" dirty="0" err="1">
+                <a:latin typeface="Courier New" panose="02070309020205020404" pitchFamily="49" charset="0"/>
+                <a:cs typeface="Courier New" panose="02070309020205020404" pitchFamily="49" charset="0"/>
+              </a:rPr>
+              <a:t>value</a:t>
+            </a:r>
+            <a:r>
+              <a:rPr lang="en-US" sz="1600" b="1" dirty="0">
+                <a:latin typeface="Courier New" panose="02070309020205020404" pitchFamily="49" charset="0"/>
+                <a:cs typeface="Courier New" panose="02070309020205020404" pitchFamily="49" charset="0"/>
+              </a:rPr>
+              <a:t> = 'Enter search term'</a:t>
+            </a:r>
+            <a:r>
+              <a:rPr lang="en-US" sz="1600" dirty="0">
+                <a:latin typeface="Courier New" panose="02070309020205020404" pitchFamily="49" charset="0"/>
+                <a:cs typeface="Courier New" panose="02070309020205020404" pitchFamily="49" charset="0"/>
+              </a:rPr>
+              <a:t>;</a:t>
+            </a:r>
+          </a:p>
+          <a:p>
+            <a:r>
+              <a:rPr lang="en-US" sz="1600" dirty="0">
+                <a:latin typeface="Courier New" panose="02070309020205020404" pitchFamily="49" charset="0"/>
+                <a:cs typeface="Courier New" panose="02070309020205020404" pitchFamily="49" charset="0"/>
+              </a:rPr>
+              <a:t>// </a:t>
+            </a:r>
+            <a:r>
+              <a:rPr lang="en-US" sz="1600" dirty="0" err="1">
+                <a:latin typeface="Courier New" panose="02070309020205020404" pitchFamily="49" charset="0"/>
+                <a:cs typeface="Courier New" panose="02070309020205020404" pitchFamily="49" charset="0"/>
+              </a:rPr>
               <a:t>document.getElementById</a:t>
             </a:r>
             <a:r>
@@ -18400,51 +18187,7 @@
                 <a:latin typeface="Courier New" panose="02070309020205020404" pitchFamily="49" charset="0"/>
                 <a:cs typeface="Courier New" panose="02070309020205020404" pitchFamily="49" charset="0"/>
               </a:rPr>
-              <a:t>('</a:t>
-            </a:r>
-            <a:r>
-              <a:rPr lang="en-US" sz="1600" dirty="0" err="1">
-                <a:latin typeface="Courier New" panose="02070309020205020404" pitchFamily="49" charset="0"/>
-                <a:cs typeface="Courier New" panose="02070309020205020404" pitchFamily="49" charset="0"/>
-              </a:rPr>
-              <a:t>btnPlay</a:t>
-            </a:r>
-            <a:r>
-              <a:rPr lang="en-US" sz="1600" dirty="0">
-                <a:latin typeface="Courier New" panose="02070309020205020404" pitchFamily="49" charset="0"/>
-                <a:cs typeface="Courier New" panose="02070309020205020404" pitchFamily="49" charset="0"/>
-              </a:rPr>
-              <a:t>');</a:t>
-            </a:r>
-          </a:p>
-          <a:p>
-            <a:r>
-              <a:rPr lang="en-US" sz="1600" b="1" dirty="0" err="1">
-                <a:latin typeface="Courier New" panose="02070309020205020404" pitchFamily="49" charset="0"/>
-                <a:cs typeface="Courier New" panose="02070309020205020404" pitchFamily="49" charset="0"/>
-              </a:rPr>
-              <a:t>btnPlay.disabled</a:t>
-            </a:r>
-            <a:r>
-              <a:rPr lang="en-US" sz="1600" b="1" dirty="0">
-                <a:latin typeface="Courier New" panose="02070309020205020404" pitchFamily="49" charset="0"/>
-                <a:cs typeface="Courier New" panose="02070309020205020404" pitchFamily="49" charset="0"/>
-              </a:rPr>
-              <a:t> = ! </a:t>
-            </a:r>
-            <a:r>
-              <a:rPr lang="en-US" sz="1600" b="1" dirty="0" err="1">
-                <a:latin typeface="Courier New" panose="02070309020205020404" pitchFamily="49" charset="0"/>
-                <a:cs typeface="Courier New" panose="02070309020205020404" pitchFamily="49" charset="0"/>
-              </a:rPr>
-              <a:t>btnPlay.disabled</a:t>
-            </a:r>
-            <a:r>
-              <a:rPr lang="en-US" sz="1600" dirty="0">
-                <a:latin typeface="Courier New" panose="02070309020205020404" pitchFamily="49" charset="0"/>
-                <a:cs typeface="Courier New" panose="02070309020205020404" pitchFamily="49" charset="0"/>
-              </a:rPr>
-              <a:t>;</a:t>
+              <a:t>('search').value = 'Enter search term';	// Alternate method</a:t>
             </a:r>
           </a:p>
         </p:txBody>
@@ -18452,7 +18195,7 @@
     </p:spTree>
     <p:extLst>
       <p:ext uri="{BB962C8B-B14F-4D97-AF65-F5344CB8AC3E}">
-        <p14:creationId xmlns:p14="http://schemas.microsoft.com/office/powerpoint/2010/main" val="1159246928"/>
+        <p14:creationId xmlns:p14="http://schemas.microsoft.com/office/powerpoint/2010/main" val="2469471083"/>
       </p:ext>
     </p:extLst>
   </p:cSld>
@@ -18519,7 +18262,7 @@
           <a:p>
             <a:r>
               <a:rPr lang="en-US" dirty="0"/>
-              <a:t>DOM HTML examples: Focus and Blur</a:t>
+              <a:t>DOM HTML examples: Button</a:t>
             </a:r>
           </a:p>
         </p:txBody>
@@ -18537,7 +18280,7 @@
         <p:spPr>
           <a:xfrm>
             <a:off x="335360" y="1628800"/>
-            <a:ext cx="9649072" cy="4679950"/>
+            <a:ext cx="11494690" cy="4679950"/>
           </a:xfrm>
         </p:spPr>
         <p:txBody>
@@ -18548,7 +18291,7 @@
           <a:p>
             <a:r>
               <a:rPr lang="en-US" sz="1600" b="1" dirty="0"/>
-              <a:t>How to set focus on an element</a:t>
+              <a:t>How to enable or disable a button</a:t>
             </a:r>
           </a:p>
           <a:p>
@@ -18610,27 +18353,108 @@
           </a:p>
           <a:p>
             <a:r>
+              <a:rPr lang="en-US" sz="1600" dirty="0">
+                <a:latin typeface="Courier New" panose="02070309020205020404" pitchFamily="49" charset="0"/>
+                <a:cs typeface="Courier New" panose="02070309020205020404" pitchFamily="49" charset="0"/>
+              </a:rPr>
+              <a:t>let </a:t>
+            </a:r>
+            <a:r>
               <a:rPr lang="en-US" sz="1600" dirty="0" err="1">
                 <a:latin typeface="Courier New" panose="02070309020205020404" pitchFamily="49" charset="0"/>
                 <a:cs typeface="Courier New" panose="02070309020205020404" pitchFamily="49" charset="0"/>
               </a:rPr>
-              <a:t>btnPlay.focus</a:t>
-            </a:r>
-            <a:r>
-              <a:rPr lang="en-US" sz="1600" dirty="0">
-                <a:latin typeface="Courier New" panose="02070309020205020404" pitchFamily="49" charset="0"/>
-                <a:cs typeface="Courier New" panose="02070309020205020404" pitchFamily="49" charset="0"/>
-              </a:rPr>
-              <a:t>();</a:t>
-            </a:r>
-          </a:p>
-          <a:p>
-            <a:endParaRPr lang="en-US" sz="1600" b="1" dirty="0"/>
+              <a:t>btnPause</a:t>
+            </a:r>
+            <a:r>
+              <a:rPr lang="en-US" sz="1600" dirty="0">
+                <a:latin typeface="Courier New" panose="02070309020205020404" pitchFamily="49" charset="0"/>
+                <a:cs typeface="Courier New" panose="02070309020205020404" pitchFamily="49" charset="0"/>
+              </a:rPr>
+              <a:t> = </a:t>
+            </a:r>
+            <a:r>
+              <a:rPr lang="en-US" sz="1600" dirty="0" err="1">
+                <a:latin typeface="Courier New" panose="02070309020205020404" pitchFamily="49" charset="0"/>
+                <a:cs typeface="Courier New" panose="02070309020205020404" pitchFamily="49" charset="0"/>
+              </a:rPr>
+              <a:t>document.getElementById</a:t>
+            </a:r>
+            <a:r>
+              <a:rPr lang="en-US" sz="1600" dirty="0">
+                <a:latin typeface="Courier New" panose="02070309020205020404" pitchFamily="49" charset="0"/>
+                <a:cs typeface="Courier New" panose="02070309020205020404" pitchFamily="49" charset="0"/>
+              </a:rPr>
+              <a:t>('</a:t>
+            </a:r>
+            <a:r>
+              <a:rPr lang="en-US" sz="1600" dirty="0" err="1">
+                <a:latin typeface="Courier New" panose="02070309020205020404" pitchFamily="49" charset="0"/>
+                <a:cs typeface="Courier New" panose="02070309020205020404" pitchFamily="49" charset="0"/>
+              </a:rPr>
+              <a:t>btnPause</a:t>
+            </a:r>
+            <a:r>
+              <a:rPr lang="en-US" sz="1600" dirty="0">
+                <a:latin typeface="Courier New" panose="02070309020205020404" pitchFamily="49" charset="0"/>
+                <a:cs typeface="Courier New" panose="02070309020205020404" pitchFamily="49" charset="0"/>
+              </a:rPr>
+              <a:t>');</a:t>
+            </a:r>
+          </a:p>
+          <a:p>
+            <a:r>
+              <a:rPr lang="en-US" sz="1600" dirty="0" err="1">
+                <a:latin typeface="Courier New" panose="02070309020205020404" pitchFamily="49" charset="0"/>
+                <a:cs typeface="Courier New" panose="02070309020205020404" pitchFamily="49" charset="0"/>
+              </a:rPr>
+              <a:t>btnPlay.</a:t>
+            </a:r>
+            <a:r>
+              <a:rPr lang="en-US" sz="1600" b="1" dirty="0" err="1">
+                <a:latin typeface="Courier New" panose="02070309020205020404" pitchFamily="49" charset="0"/>
+                <a:cs typeface="Courier New" panose="02070309020205020404" pitchFamily="49" charset="0"/>
+              </a:rPr>
+              <a:t>disabled</a:t>
+            </a:r>
+            <a:r>
+              <a:rPr lang="en-US" sz="1600" dirty="0">
+                <a:latin typeface="Courier New" panose="02070309020205020404" pitchFamily="49" charset="0"/>
+                <a:cs typeface="Courier New" panose="02070309020205020404" pitchFamily="49" charset="0"/>
+              </a:rPr>
+              <a:t> = true;</a:t>
+            </a:r>
+          </a:p>
+          <a:p>
+            <a:r>
+              <a:rPr lang="en-US" sz="1600" dirty="0" err="1">
+                <a:latin typeface="Courier New" panose="02070309020205020404" pitchFamily="49" charset="0"/>
+                <a:cs typeface="Courier New" panose="02070309020205020404" pitchFamily="49" charset="0"/>
+              </a:rPr>
+              <a:t>btnPause.</a:t>
+            </a:r>
+            <a:r>
+              <a:rPr lang="en-US" sz="1600" b="1" dirty="0" err="1">
+                <a:latin typeface="Courier New" panose="02070309020205020404" pitchFamily="49" charset="0"/>
+                <a:cs typeface="Courier New" panose="02070309020205020404" pitchFamily="49" charset="0"/>
+              </a:rPr>
+              <a:t>disabled</a:t>
+            </a:r>
+            <a:r>
+              <a:rPr lang="en-US" sz="1600" dirty="0">
+                <a:latin typeface="Courier New" panose="02070309020205020404" pitchFamily="49" charset="0"/>
+                <a:cs typeface="Courier New" panose="02070309020205020404" pitchFamily="49" charset="0"/>
+              </a:rPr>
+              <a:t> = false;</a:t>
+            </a:r>
+          </a:p>
+          <a:p>
+            <a:endParaRPr lang="en-US" sz="1600" dirty="0"/>
           </a:p>
           <a:p>
             <a:r>
               <a:rPr lang="en-US" sz="1600" b="1" dirty="0"/>
-              <a:t>How to blur an element</a:t>
+              <a:t>How to toggle a button's disabled property</a:t>
             </a:r>
           </a:p>
           <a:p>
@@ -18692,18 +18516,32 @@
           </a:p>
           <a:p>
             <a:r>
-              <a:rPr lang="en-US" sz="1600" dirty="0" err="1">
-                <a:latin typeface="Courier New" panose="02070309020205020404" pitchFamily="49" charset="0"/>
-                <a:cs typeface="Courier New" panose="02070309020205020404" pitchFamily="49" charset="0"/>
-              </a:rPr>
-              <a:t>btnPlay.blur</a:t>
-            </a:r>
-            <a:r>
-              <a:rPr lang="en-US" sz="1600" dirty="0">
-                <a:latin typeface="Courier New" panose="02070309020205020404" pitchFamily="49" charset="0"/>
-                <a:cs typeface="Courier New" panose="02070309020205020404" pitchFamily="49" charset="0"/>
-              </a:rPr>
-              <a:t>();</a:t>
+              <a:rPr lang="en-US" sz="1600" b="1" dirty="0" err="1">
+                <a:latin typeface="Courier New" panose="02070309020205020404" pitchFamily="49" charset="0"/>
+                <a:cs typeface="Courier New" panose="02070309020205020404" pitchFamily="49" charset="0"/>
+              </a:rPr>
+              <a:t>btnPlay.disabled</a:t>
+            </a:r>
+            <a:r>
+              <a:rPr lang="en-US" sz="1600" b="1" dirty="0">
+                <a:latin typeface="Courier New" panose="02070309020205020404" pitchFamily="49" charset="0"/>
+                <a:cs typeface="Courier New" panose="02070309020205020404" pitchFamily="49" charset="0"/>
+              </a:rPr>
+              <a:t> = ! </a:t>
+            </a:r>
+            <a:r>
+              <a:rPr lang="en-US" sz="1600" b="1" dirty="0" err="1">
+                <a:latin typeface="Courier New" panose="02070309020205020404" pitchFamily="49" charset="0"/>
+                <a:cs typeface="Courier New" panose="02070309020205020404" pitchFamily="49" charset="0"/>
+              </a:rPr>
+              <a:t>btnPlay.disabled</a:t>
+            </a:r>
+            <a:r>
+              <a:rPr lang="en-US" sz="1600" dirty="0">
+                <a:latin typeface="Courier New" panose="02070309020205020404" pitchFamily="49" charset="0"/>
+                <a:cs typeface="Courier New" panose="02070309020205020404" pitchFamily="49" charset="0"/>
+              </a:rPr>
+              <a:t>;</a:t>
             </a:r>
           </a:p>
         </p:txBody>
@@ -18711,7 +18549,7 @@
     </p:spTree>
     <p:extLst>
       <p:ext uri="{BB962C8B-B14F-4D97-AF65-F5344CB8AC3E}">
-        <p14:creationId xmlns:p14="http://schemas.microsoft.com/office/powerpoint/2010/main" val="4035644992"/>
+        <p14:creationId xmlns:p14="http://schemas.microsoft.com/office/powerpoint/2010/main" val="1159246928"/>
       </p:ext>
     </p:extLst>
   </p:cSld>
@@ -18778,7 +18616,7 @@
           <a:p>
             <a:r>
               <a:rPr lang="en-US" dirty="0"/>
-              <a:t>DOM HTML examples: Select</a:t>
+              <a:t>DOM HTML examples: Focus and Blur</a:t>
             </a:r>
           </a:p>
         </p:txBody>
@@ -18807,7 +18645,7 @@
           <a:p>
             <a:r>
               <a:rPr lang="en-US" sz="1600" b="1" dirty="0"/>
-              <a:t>Retrieve the selected item in a list</a:t>
+              <a:t>How to set focus on an element</a:t>
             </a:r>
           </a:p>
           <a:p>
@@ -18822,13 +18660,27 @@
                 <a:latin typeface="Courier New" panose="02070309020205020404" pitchFamily="49" charset="0"/>
                 <a:cs typeface="Courier New" panose="02070309020205020404" pitchFamily="49" charset="0"/>
               </a:rPr>
-              <a:t>let country = </a:t>
+              <a:t>let </a:t>
             </a:r>
             <a:r>
               <a:rPr lang="en-US" sz="1600" dirty="0" err="1">
                 <a:latin typeface="Courier New" panose="02070309020205020404" pitchFamily="49" charset="0"/>
                 <a:cs typeface="Courier New" panose="02070309020205020404" pitchFamily="49" charset="0"/>
               </a:rPr>
+              <a:t>btnPlay</a:t>
+            </a:r>
+            <a:r>
+              <a:rPr lang="en-US" sz="1600" dirty="0">
+                <a:latin typeface="Courier New" panose="02070309020205020404" pitchFamily="49" charset="0"/>
+                <a:cs typeface="Courier New" panose="02070309020205020404" pitchFamily="49" charset="0"/>
+              </a:rPr>
+              <a:t> = </a:t>
+            </a:r>
+            <a:r>
+              <a:rPr lang="en-US" sz="1600" dirty="0" err="1">
+                <a:latin typeface="Courier New" panose="02070309020205020404" pitchFamily="49" charset="0"/>
+                <a:cs typeface="Courier New" panose="02070309020205020404" pitchFamily="49" charset="0"/>
+              </a:rPr>
               <a:t>document.getElementById</a:t>
             </a:r>
             <a:r>
@@ -18836,55 +18688,119 @@
                 <a:latin typeface="Courier New" panose="02070309020205020404" pitchFamily="49" charset="0"/>
                 <a:cs typeface="Courier New" panose="02070309020205020404" pitchFamily="49" charset="0"/>
               </a:rPr>
-              <a:t>('country');</a:t>
-            </a:r>
-          </a:p>
-          <a:p>
+              <a:t>('</a:t>
+            </a:r>
             <a:r>
               <a:rPr lang="en-US" sz="1600" dirty="0" err="1">
                 <a:latin typeface="Courier New" panose="02070309020205020404" pitchFamily="49" charset="0"/>
                 <a:cs typeface="Courier New" panose="02070309020205020404" pitchFamily="49" charset="0"/>
               </a:rPr>
-              <a:t>country.addEventListener</a:t>
-            </a:r>
-            <a:r>
-              <a:rPr lang="en-US" sz="1600" dirty="0">
-                <a:latin typeface="Courier New" panose="02070309020205020404" pitchFamily="49" charset="0"/>
-                <a:cs typeface="Courier New" panose="02070309020205020404" pitchFamily="49" charset="0"/>
-              </a:rPr>
-              <a:t>('change', ()  =&gt; {</a:t>
-            </a:r>
-          </a:p>
-          <a:p>
-            <a:r>
-              <a:rPr lang="en-US" sz="1600" dirty="0">
-                <a:latin typeface="Courier New" panose="02070309020205020404" pitchFamily="49" charset="0"/>
-                <a:cs typeface="Courier New" panose="02070309020205020404" pitchFamily="49" charset="0"/>
-              </a:rPr>
-              <a:t>	console.log(</a:t>
-            </a:r>
+              <a:t>btnPlay</a:t>
+            </a:r>
+            <a:r>
+              <a:rPr lang="en-US" sz="1600" dirty="0">
+                <a:latin typeface="Courier New" panose="02070309020205020404" pitchFamily="49" charset="0"/>
+                <a:cs typeface="Courier New" panose="02070309020205020404" pitchFamily="49" charset="0"/>
+              </a:rPr>
+              <a:t>');</a:t>
+            </a:r>
+          </a:p>
+          <a:p>
             <a:r>
               <a:rPr lang="en-US" sz="1600" dirty="0" err="1">
                 <a:latin typeface="Courier New" panose="02070309020205020404" pitchFamily="49" charset="0"/>
                 <a:cs typeface="Courier New" panose="02070309020205020404" pitchFamily="49" charset="0"/>
               </a:rPr>
-              <a:t>country.value</a:t>
-            </a:r>
-            <a:r>
-              <a:rPr lang="en-US" sz="1600" dirty="0">
-                <a:latin typeface="Courier New" panose="02070309020205020404" pitchFamily="49" charset="0"/>
-                <a:cs typeface="Courier New" panose="02070309020205020404" pitchFamily="49" charset="0"/>
-              </a:rPr>
-              <a:t>);</a:t>
-            </a:r>
-          </a:p>
-          <a:p>
-            <a:r>
-              <a:rPr lang="en-US" sz="1600" dirty="0">
-                <a:latin typeface="Courier New" panose="02070309020205020404" pitchFamily="49" charset="0"/>
-                <a:cs typeface="Courier New" panose="02070309020205020404" pitchFamily="49" charset="0"/>
-              </a:rPr>
-              <a:t>});</a:t>
+              <a:t>btnPlay.focus</a:t>
+            </a:r>
+            <a:r>
+              <a:rPr lang="en-US" sz="1600" dirty="0">
+                <a:latin typeface="Courier New" panose="02070309020205020404" pitchFamily="49" charset="0"/>
+                <a:cs typeface="Courier New" panose="02070309020205020404" pitchFamily="49" charset="0"/>
+              </a:rPr>
+              <a:t>();</a:t>
+            </a:r>
+          </a:p>
+          <a:p>
+            <a:endParaRPr lang="en-US" sz="1600" b="1" dirty="0"/>
+          </a:p>
+          <a:p>
+            <a:r>
+              <a:rPr lang="en-US" sz="1600" b="1" dirty="0"/>
+              <a:t>How to blur an element</a:t>
+            </a:r>
+          </a:p>
+          <a:p>
+            <a:endParaRPr lang="en-US" sz="1600" b="1" dirty="0">
+              <a:latin typeface="Courier New" panose="02070309020205020404" pitchFamily="49" charset="0"/>
+              <a:cs typeface="Courier New" panose="02070309020205020404" pitchFamily="49" charset="0"/>
+            </a:endParaRPr>
+          </a:p>
+          <a:p>
+            <a:r>
+              <a:rPr lang="en-US" sz="1600" dirty="0">
+                <a:latin typeface="Courier New" panose="02070309020205020404" pitchFamily="49" charset="0"/>
+                <a:cs typeface="Courier New" panose="02070309020205020404" pitchFamily="49" charset="0"/>
+              </a:rPr>
+              <a:t>let </a:t>
+            </a:r>
+            <a:r>
+              <a:rPr lang="en-US" sz="1600" dirty="0" err="1">
+                <a:latin typeface="Courier New" panose="02070309020205020404" pitchFamily="49" charset="0"/>
+                <a:cs typeface="Courier New" panose="02070309020205020404" pitchFamily="49" charset="0"/>
+              </a:rPr>
+              <a:t>btnPlay</a:t>
+            </a:r>
+            <a:r>
+              <a:rPr lang="en-US" sz="1600" dirty="0">
+                <a:latin typeface="Courier New" panose="02070309020205020404" pitchFamily="49" charset="0"/>
+                <a:cs typeface="Courier New" panose="02070309020205020404" pitchFamily="49" charset="0"/>
+              </a:rPr>
+              <a:t> = </a:t>
+            </a:r>
+            <a:r>
+              <a:rPr lang="en-US" sz="1600" dirty="0" err="1">
+                <a:latin typeface="Courier New" panose="02070309020205020404" pitchFamily="49" charset="0"/>
+                <a:cs typeface="Courier New" panose="02070309020205020404" pitchFamily="49" charset="0"/>
+              </a:rPr>
+              <a:t>document.getElementById</a:t>
+            </a:r>
+            <a:r>
+              <a:rPr lang="en-US" sz="1600" dirty="0">
+                <a:latin typeface="Courier New" panose="02070309020205020404" pitchFamily="49" charset="0"/>
+                <a:cs typeface="Courier New" panose="02070309020205020404" pitchFamily="49" charset="0"/>
+              </a:rPr>
+              <a:t>('</a:t>
+            </a:r>
+            <a:r>
+              <a:rPr lang="en-US" sz="1600" dirty="0" err="1">
+                <a:latin typeface="Courier New" panose="02070309020205020404" pitchFamily="49" charset="0"/>
+                <a:cs typeface="Courier New" panose="02070309020205020404" pitchFamily="49" charset="0"/>
+              </a:rPr>
+              <a:t>btnPlay</a:t>
+            </a:r>
+            <a:r>
+              <a:rPr lang="en-US" sz="1600" dirty="0">
+                <a:latin typeface="Courier New" panose="02070309020205020404" pitchFamily="49" charset="0"/>
+                <a:cs typeface="Courier New" panose="02070309020205020404" pitchFamily="49" charset="0"/>
+              </a:rPr>
+              <a:t>');</a:t>
+            </a:r>
+          </a:p>
+          <a:p>
+            <a:r>
+              <a:rPr lang="en-US" sz="1600" dirty="0" err="1">
+                <a:latin typeface="Courier New" panose="02070309020205020404" pitchFamily="49" charset="0"/>
+                <a:cs typeface="Courier New" panose="02070309020205020404" pitchFamily="49" charset="0"/>
+              </a:rPr>
+              <a:t>btnPlay.blur</a:t>
+            </a:r>
+            <a:r>
+              <a:rPr lang="en-US" sz="1600" dirty="0">
+                <a:latin typeface="Courier New" panose="02070309020205020404" pitchFamily="49" charset="0"/>
+                <a:cs typeface="Courier New" panose="02070309020205020404" pitchFamily="49" charset="0"/>
+              </a:rPr>
+              <a:t>();</a:t>
             </a:r>
           </a:p>
         </p:txBody>
@@ -18892,7 +18808,7 @@
     </p:spTree>
     <p:extLst>
       <p:ext uri="{BB962C8B-B14F-4D97-AF65-F5344CB8AC3E}">
-        <p14:creationId xmlns:p14="http://schemas.microsoft.com/office/powerpoint/2010/main" val="1062442582"/>
+        <p14:creationId xmlns:p14="http://schemas.microsoft.com/office/powerpoint/2010/main" val="4035644992"/>
       </p:ext>
     </p:extLst>
   </p:cSld>
@@ -18987,10 +18903,8 @@
           <a:lstStyle/>
           <a:p>
             <a:r>
-              <a:rPr lang="en-US" sz="1600" b="1" dirty="0">
-                <a:cs typeface="Courier New" panose="02070309020205020404" pitchFamily="49" charset="0"/>
-              </a:rPr>
-              <a:t>Adding items programmatically to a list</a:t>
+              <a:rPr lang="en-US" sz="1600" b="1" dirty="0"/>
+              <a:t>Retrieve the selected item in a list</a:t>
             </a:r>
           </a:p>
           <a:p>
@@ -19005,7 +18919,7 @@
                 <a:latin typeface="Courier New" panose="02070309020205020404" pitchFamily="49" charset="0"/>
                 <a:cs typeface="Courier New" panose="02070309020205020404" pitchFamily="49" charset="0"/>
               </a:rPr>
-              <a:t>let years = </a:t>
+              <a:t>let country = </a:t>
             </a:r>
             <a:r>
               <a:rPr lang="en-US" sz="1600" dirty="0" err="1">
@@ -19019,131 +18933,55 @@
                 <a:latin typeface="Courier New" panose="02070309020205020404" pitchFamily="49" charset="0"/>
                 <a:cs typeface="Courier New" panose="02070309020205020404" pitchFamily="49" charset="0"/>
               </a:rPr>
-              <a:t>('years');</a:t>
-            </a:r>
-          </a:p>
-          <a:p>
-            <a:r>
-              <a:rPr lang="en-US" sz="1600" dirty="0">
-                <a:latin typeface="Courier New" panose="02070309020205020404" pitchFamily="49" charset="0"/>
-                <a:cs typeface="Courier New" panose="02070309020205020404" pitchFamily="49" charset="0"/>
-              </a:rPr>
-              <a:t>for (let i = 1; i &lt;= 10; i++) {</a:t>
-            </a:r>
-          </a:p>
-          <a:p>
-            <a:r>
-              <a:rPr lang="en-US" sz="1600" dirty="0">
-                <a:latin typeface="Courier New" panose="02070309020205020404" pitchFamily="49" charset="0"/>
-                <a:cs typeface="Courier New" panose="02070309020205020404" pitchFamily="49" charset="0"/>
-              </a:rPr>
-              <a:t>	let option = </a:t>
-            </a:r>
+              <a:t>('country');</a:t>
+            </a:r>
+          </a:p>
+          <a:p>
             <a:r>
               <a:rPr lang="en-US" sz="1600" dirty="0" err="1">
                 <a:latin typeface="Courier New" panose="02070309020205020404" pitchFamily="49" charset="0"/>
                 <a:cs typeface="Courier New" panose="02070309020205020404" pitchFamily="49" charset="0"/>
               </a:rPr>
-              <a:t>document.</a:t>
-            </a:r>
-            <a:r>
-              <a:rPr lang="en-US" sz="1600" b="1" dirty="0" err="1">
-                <a:latin typeface="Courier New" panose="02070309020205020404" pitchFamily="49" charset="0"/>
-                <a:cs typeface="Courier New" panose="02070309020205020404" pitchFamily="49" charset="0"/>
-              </a:rPr>
-              <a:t>createElement</a:t>
-            </a:r>
-            <a:r>
-              <a:rPr lang="en-US" sz="1600" b="1" dirty="0">
-                <a:latin typeface="Courier New" panose="02070309020205020404" pitchFamily="49" charset="0"/>
-                <a:cs typeface="Courier New" panose="02070309020205020404" pitchFamily="49" charset="0"/>
-              </a:rPr>
-              <a:t>('option')</a:t>
-            </a:r>
-            <a:r>
-              <a:rPr lang="en-US" sz="1600" dirty="0">
-                <a:latin typeface="Courier New" panose="02070309020205020404" pitchFamily="49" charset="0"/>
-                <a:cs typeface="Courier New" panose="02070309020205020404" pitchFamily="49" charset="0"/>
-              </a:rPr>
-              <a:t>;</a:t>
-            </a:r>
-          </a:p>
-          <a:p>
-            <a:r>
-              <a:rPr lang="en-US" sz="1600" b="1" dirty="0">
-                <a:latin typeface="Courier New" panose="02070309020205020404" pitchFamily="49" charset="0"/>
-                <a:cs typeface="Courier New" panose="02070309020205020404" pitchFamily="49" charset="0"/>
-              </a:rPr>
-              <a:t>	</a:t>
-            </a:r>
-            <a:r>
-              <a:rPr lang="en-US" sz="1600" b="1" dirty="0" err="1">
-                <a:latin typeface="Courier New" panose="02070309020205020404" pitchFamily="49" charset="0"/>
-                <a:cs typeface="Courier New" panose="02070309020205020404" pitchFamily="49" charset="0"/>
-              </a:rPr>
-              <a:t>option.text</a:t>
-            </a:r>
-            <a:r>
-              <a:rPr lang="en-US" sz="1600" b="1" dirty="0">
-                <a:latin typeface="Courier New" panose="02070309020205020404" pitchFamily="49" charset="0"/>
-                <a:cs typeface="Courier New" panose="02070309020205020404" pitchFamily="49" charset="0"/>
-              </a:rPr>
-              <a:t> = 'Item ' + i;</a:t>
-            </a:r>
-          </a:p>
-          <a:p>
-            <a:r>
-              <a:rPr lang="en-US" sz="1600" b="1" dirty="0">
-                <a:latin typeface="Courier New" panose="02070309020205020404" pitchFamily="49" charset="0"/>
-                <a:cs typeface="Courier New" panose="02070309020205020404" pitchFamily="49" charset="0"/>
-              </a:rPr>
-              <a:t>	</a:t>
-            </a:r>
-            <a:r>
-              <a:rPr lang="en-US" sz="1600" b="1" dirty="0" err="1">
-                <a:latin typeface="Courier New" panose="02070309020205020404" pitchFamily="49" charset="0"/>
-                <a:cs typeface="Courier New" panose="02070309020205020404" pitchFamily="49" charset="0"/>
-              </a:rPr>
-              <a:t>option.value</a:t>
-            </a:r>
-            <a:r>
-              <a:rPr lang="en-US" sz="1600" b="1" dirty="0">
-                <a:latin typeface="Courier New" panose="02070309020205020404" pitchFamily="49" charset="0"/>
-                <a:cs typeface="Courier New" panose="02070309020205020404" pitchFamily="49" charset="0"/>
-              </a:rPr>
-              <a:t> = i;</a:t>
-            </a:r>
-          </a:p>
-          <a:p>
-            <a:r>
-              <a:rPr lang="en-US" sz="1600" b="1" dirty="0">
-                <a:latin typeface="Courier New" panose="02070309020205020404" pitchFamily="49" charset="0"/>
-                <a:cs typeface="Courier New" panose="02070309020205020404" pitchFamily="49" charset="0"/>
-              </a:rPr>
-              <a:t>	</a:t>
-            </a:r>
-            <a:r>
-              <a:rPr lang="en-US" sz="1600" b="1" dirty="0" err="1">
-                <a:latin typeface="Courier New" panose="02070309020205020404" pitchFamily="49" charset="0"/>
-                <a:cs typeface="Courier New" panose="02070309020205020404" pitchFamily="49" charset="0"/>
-              </a:rPr>
-              <a:t>years.add</a:t>
-            </a:r>
-            <a:r>
-              <a:rPr lang="en-US" sz="1600" b="1" dirty="0">
-                <a:latin typeface="Courier New" panose="02070309020205020404" pitchFamily="49" charset="0"/>
-                <a:cs typeface="Courier New" panose="02070309020205020404" pitchFamily="49" charset="0"/>
-              </a:rPr>
-              <a:t>(option, 0);</a:t>
-            </a:r>
-          </a:p>
-          <a:p>
-            <a:r>
-              <a:rPr lang="en-US" sz="1600" dirty="0">
-                <a:latin typeface="Courier New" panose="02070309020205020404" pitchFamily="49" charset="0"/>
-                <a:cs typeface="Courier New" panose="02070309020205020404" pitchFamily="49" charset="0"/>
-              </a:rPr>
-              <a:t>}</a:t>
+              <a:t>country.addEventListener</a:t>
+            </a:r>
+            <a:r>
+              <a:rPr lang="en-US" sz="1600" dirty="0">
+                <a:latin typeface="Courier New" panose="02070309020205020404" pitchFamily="49" charset="0"/>
+                <a:cs typeface="Courier New" panose="02070309020205020404" pitchFamily="49" charset="0"/>
+              </a:rPr>
+              <a:t>('change', ()  =&gt; {</a:t>
+            </a:r>
+          </a:p>
+          <a:p>
+            <a:r>
+              <a:rPr lang="en-US" sz="1600" dirty="0">
+                <a:latin typeface="Courier New" panose="02070309020205020404" pitchFamily="49" charset="0"/>
+                <a:cs typeface="Courier New" panose="02070309020205020404" pitchFamily="49" charset="0"/>
+              </a:rPr>
+              <a:t>	console.log(</a:t>
+            </a:r>
+            <a:r>
+              <a:rPr lang="en-US" sz="1600" dirty="0" err="1">
+                <a:latin typeface="Courier New" panose="02070309020205020404" pitchFamily="49" charset="0"/>
+                <a:cs typeface="Courier New" panose="02070309020205020404" pitchFamily="49" charset="0"/>
+              </a:rPr>
+              <a:t>country.value</a:t>
+            </a:r>
+            <a:r>
+              <a:rPr lang="en-US" sz="1600" dirty="0">
+                <a:latin typeface="Courier New" panose="02070309020205020404" pitchFamily="49" charset="0"/>
+                <a:cs typeface="Courier New" panose="02070309020205020404" pitchFamily="49" charset="0"/>
+              </a:rPr>
+              <a:t>);</a:t>
+            </a:r>
+          </a:p>
+          <a:p>
+            <a:r>
+              <a:rPr lang="en-US" sz="1600" dirty="0">
+                <a:latin typeface="Courier New" panose="02070309020205020404" pitchFamily="49" charset="0"/>
+                <a:cs typeface="Courier New" panose="02070309020205020404" pitchFamily="49" charset="0"/>
+              </a:rPr>
+              <a:t>});</a:t>
             </a:r>
           </a:p>
         </p:txBody>
@@ -19151,7 +18989,7 @@
     </p:spTree>
     <p:extLst>
       <p:ext uri="{BB962C8B-B14F-4D97-AF65-F5344CB8AC3E}">
-        <p14:creationId xmlns:p14="http://schemas.microsoft.com/office/powerpoint/2010/main" val="2695689481"/>
+        <p14:creationId xmlns:p14="http://schemas.microsoft.com/office/powerpoint/2010/main" val="1062442582"/>
       </p:ext>
     </p:extLst>
   </p:cSld>
@@ -19218,7 +19056,7 @@
           <a:p>
             <a:r>
               <a:rPr lang="en-US" dirty="0"/>
-              <a:t>DOM HTML examples: Checkbox and Radio Buttons</a:t>
+              <a:t>DOM HTML examples: Select</a:t>
             </a:r>
           </a:p>
         </p:txBody>
@@ -19246,8 +19084,10 @@
           <a:lstStyle/>
           <a:p>
             <a:r>
-              <a:rPr lang="en-US" sz="1600" b="1" dirty="0"/>
-              <a:t>Get all checked checkboxes in a page and display their values</a:t>
+              <a:rPr lang="en-US" sz="1600" b="1" dirty="0">
+                <a:cs typeface="Courier New" panose="02070309020205020404" pitchFamily="49" charset="0"/>
+              </a:rPr>
+              <a:t>Adding items programmatically to a list</a:t>
             </a:r>
           </a:p>
           <a:p>
@@ -19262,13 +19102,45 @@
                 <a:latin typeface="Courier New" panose="02070309020205020404" pitchFamily="49" charset="0"/>
                 <a:cs typeface="Courier New" panose="02070309020205020404" pitchFamily="49" charset="0"/>
               </a:rPr>
-              <a:t>let product = </a:t>
+              <a:t>let years = </a:t>
             </a:r>
             <a:r>
               <a:rPr lang="en-US" sz="1600" dirty="0" err="1">
                 <a:latin typeface="Courier New" panose="02070309020205020404" pitchFamily="49" charset="0"/>
                 <a:cs typeface="Courier New" panose="02070309020205020404" pitchFamily="49" charset="0"/>
               </a:rPr>
+              <a:t>document.getElementById</a:t>
+            </a:r>
+            <a:r>
+              <a:rPr lang="en-US" sz="1600" dirty="0">
+                <a:latin typeface="Courier New" panose="02070309020205020404" pitchFamily="49" charset="0"/>
+                <a:cs typeface="Courier New" panose="02070309020205020404" pitchFamily="49" charset="0"/>
+              </a:rPr>
+              <a:t>('years');</a:t>
+            </a:r>
+          </a:p>
+          <a:p>
+            <a:r>
+              <a:rPr lang="en-US" sz="1600" dirty="0">
+                <a:latin typeface="Courier New" panose="02070309020205020404" pitchFamily="49" charset="0"/>
+                <a:cs typeface="Courier New" panose="02070309020205020404" pitchFamily="49" charset="0"/>
+              </a:rPr>
+              <a:t>for (let i = 1; i &lt;= 10; i++) {</a:t>
+            </a:r>
+          </a:p>
+          <a:p>
+            <a:r>
+              <a:rPr lang="en-US" sz="1600" dirty="0">
+                <a:latin typeface="Courier New" panose="02070309020205020404" pitchFamily="49" charset="0"/>
+                <a:cs typeface="Courier New" panose="02070309020205020404" pitchFamily="49" charset="0"/>
+              </a:rPr>
+              <a:t>	let option = </a:t>
+            </a:r>
+            <a:r>
+              <a:rPr lang="en-US" sz="1600" dirty="0" err="1">
+                <a:latin typeface="Courier New" panose="02070309020205020404" pitchFamily="49" charset="0"/>
+                <a:cs typeface="Courier New" panose="02070309020205020404" pitchFamily="49" charset="0"/>
+              </a:rPr>
               <a:t>document.</a:t>
             </a:r>
             <a:r>
@@ -19276,14 +19148,14 @@
                 <a:latin typeface="Courier New" panose="02070309020205020404" pitchFamily="49" charset="0"/>
                 <a:cs typeface="Courier New" panose="02070309020205020404" pitchFamily="49" charset="0"/>
               </a:rPr>
-              <a:t>getElementsByName</a:t>
+              <a:t>createElement</a:t>
             </a:r>
             <a:r>
               <a:rPr lang="en-US" sz="1600" b="1" dirty="0">
                 <a:latin typeface="Courier New" panose="02070309020205020404" pitchFamily="49" charset="0"/>
                 <a:cs typeface="Courier New" panose="02070309020205020404" pitchFamily="49" charset="0"/>
               </a:rPr>
-              <a:t>('product')</a:t>
+              <a:t>('option')</a:t>
             </a:r>
             <a:r>
               <a:rPr lang="en-US" sz="1600" dirty="0">
@@ -19295,80 +19167,71 @@
           </a:p>
           <a:p>
             <a:r>
-              <a:rPr lang="en-US" sz="1600" dirty="0">
-                <a:latin typeface="Courier New" panose="02070309020205020404" pitchFamily="49" charset="0"/>
-                <a:cs typeface="Courier New" panose="02070309020205020404" pitchFamily="49" charset="0"/>
-              </a:rPr>
-              <a:t>for (let i = 0; i &lt; </a:t>
-            </a:r>
-            <a:r>
-              <a:rPr lang="en-US" sz="1600" dirty="0" err="1">
-                <a:latin typeface="Courier New" panose="02070309020205020404" pitchFamily="49" charset="0"/>
-                <a:cs typeface="Courier New" panose="02070309020205020404" pitchFamily="49" charset="0"/>
-              </a:rPr>
-              <a:t>product.length</a:t>
-            </a:r>
-            <a:r>
-              <a:rPr lang="en-US" sz="1600" dirty="0">
-                <a:latin typeface="Courier New" panose="02070309020205020404" pitchFamily="49" charset="0"/>
-                <a:cs typeface="Courier New" panose="02070309020205020404" pitchFamily="49" charset="0"/>
-              </a:rPr>
-              <a:t>; i++) {</a:t>
-            </a:r>
-          </a:p>
-          <a:p>
-            <a:r>
-              <a:rPr lang="en-US" sz="1600" dirty="0">
-                <a:latin typeface="Courier New" panose="02070309020205020404" pitchFamily="49" charset="0"/>
-                <a:cs typeface="Courier New" panose="02070309020205020404" pitchFamily="49" charset="0"/>
-              </a:rPr>
-              <a:t>	if (product[i].</a:t>
-            </a:r>
-            <a:r>
               <a:rPr lang="en-US" sz="1600" b="1" dirty="0">
                 <a:latin typeface="Courier New" panose="02070309020205020404" pitchFamily="49" charset="0"/>
                 <a:cs typeface="Courier New" panose="02070309020205020404" pitchFamily="49" charset="0"/>
               </a:rPr>
-              <a:t>checked</a:t>
-            </a:r>
-            <a:r>
-              <a:rPr lang="en-US" sz="1600" dirty="0">
-                <a:latin typeface="Courier New" panose="02070309020205020404" pitchFamily="49" charset="0"/>
-                <a:cs typeface="Courier New" panose="02070309020205020404" pitchFamily="49" charset="0"/>
-              </a:rPr>
-              <a:t>) {</a:t>
-            </a:r>
-          </a:p>
-          <a:p>
-            <a:r>
-              <a:rPr lang="en-US" sz="1600" dirty="0">
-                <a:latin typeface="Courier New" panose="02070309020205020404" pitchFamily="49" charset="0"/>
-                <a:cs typeface="Courier New" panose="02070309020205020404" pitchFamily="49" charset="0"/>
-              </a:rPr>
-              <a:t>		console.log(product[i].</a:t>
+              <a:t>	</a:t>
+            </a:r>
+            <a:r>
+              <a:rPr lang="en-US" sz="1600" b="1" dirty="0" err="1">
+                <a:latin typeface="Courier New" panose="02070309020205020404" pitchFamily="49" charset="0"/>
+                <a:cs typeface="Courier New" panose="02070309020205020404" pitchFamily="49" charset="0"/>
+              </a:rPr>
+              <a:t>option.text</a:t>
             </a:r>
             <a:r>
               <a:rPr lang="en-US" sz="1600" b="1" dirty="0">
                 <a:latin typeface="Courier New" panose="02070309020205020404" pitchFamily="49" charset="0"/>
                 <a:cs typeface="Courier New" panose="02070309020205020404" pitchFamily="49" charset="0"/>
               </a:rPr>
-              <a:t>value</a:t>
-            </a:r>
-            <a:r>
-              <a:rPr lang="en-US" sz="1600" dirty="0">
-                <a:latin typeface="Courier New" panose="02070309020205020404" pitchFamily="49" charset="0"/>
-                <a:cs typeface="Courier New" panose="02070309020205020404" pitchFamily="49" charset="0"/>
-              </a:rPr>
-              <a:t>);</a:t>
-            </a:r>
-          </a:p>
-          <a:p>
-            <a:r>
-              <a:rPr lang="en-US" sz="1600" dirty="0">
-                <a:latin typeface="Courier New" panose="02070309020205020404" pitchFamily="49" charset="0"/>
-                <a:cs typeface="Courier New" panose="02070309020205020404" pitchFamily="49" charset="0"/>
-              </a:rPr>
-              <a:t>	}</a:t>
+              <a:t> = 'Item ' + i;</a:t>
+            </a:r>
+          </a:p>
+          <a:p>
+            <a:r>
+              <a:rPr lang="en-US" sz="1600" b="1" dirty="0">
+                <a:latin typeface="Courier New" panose="02070309020205020404" pitchFamily="49" charset="0"/>
+                <a:cs typeface="Courier New" panose="02070309020205020404" pitchFamily="49" charset="0"/>
+              </a:rPr>
+              <a:t>	</a:t>
+            </a:r>
+            <a:r>
+              <a:rPr lang="en-US" sz="1600" b="1" dirty="0" err="1">
+                <a:latin typeface="Courier New" panose="02070309020205020404" pitchFamily="49" charset="0"/>
+                <a:cs typeface="Courier New" panose="02070309020205020404" pitchFamily="49" charset="0"/>
+              </a:rPr>
+              <a:t>option.value</a:t>
+            </a:r>
+            <a:r>
+              <a:rPr lang="en-US" sz="1600" b="1" dirty="0">
+                <a:latin typeface="Courier New" panose="02070309020205020404" pitchFamily="49" charset="0"/>
+                <a:cs typeface="Courier New" panose="02070309020205020404" pitchFamily="49" charset="0"/>
+              </a:rPr>
+              <a:t> = i;</a:t>
+            </a:r>
+          </a:p>
+          <a:p>
+            <a:r>
+              <a:rPr lang="en-US" sz="1600" b="1" dirty="0">
+                <a:latin typeface="Courier New" panose="02070309020205020404" pitchFamily="49" charset="0"/>
+                <a:cs typeface="Courier New" panose="02070309020205020404" pitchFamily="49" charset="0"/>
+              </a:rPr>
+              <a:t>	</a:t>
+            </a:r>
+            <a:r>
+              <a:rPr lang="en-US" sz="1600" b="1" dirty="0" err="1">
+                <a:latin typeface="Courier New" panose="02070309020205020404" pitchFamily="49" charset="0"/>
+                <a:cs typeface="Courier New" panose="02070309020205020404" pitchFamily="49" charset="0"/>
+              </a:rPr>
+              <a:t>years.add</a:t>
+            </a:r>
+            <a:r>
+              <a:rPr lang="en-US" sz="1600" b="1" dirty="0">
+                <a:latin typeface="Courier New" panose="02070309020205020404" pitchFamily="49" charset="0"/>
+                <a:cs typeface="Courier New" panose="02070309020205020404" pitchFamily="49" charset="0"/>
+              </a:rPr>
+              <a:t>(option, 0);</a:t>
             </a:r>
           </a:p>
           <a:p>
@@ -19385,7 +19248,7 @@
     </p:spTree>
     <p:extLst>
       <p:ext uri="{BB962C8B-B14F-4D97-AF65-F5344CB8AC3E}">
-        <p14:creationId xmlns:p14="http://schemas.microsoft.com/office/powerpoint/2010/main" val="980239286"/>
+        <p14:creationId xmlns:p14="http://schemas.microsoft.com/office/powerpoint/2010/main" val="2695689481"/>
       </p:ext>
     </p:extLst>
   </p:cSld>
@@ -19414,7 +19277,7 @@
       </p:grpSpPr>
       <p:sp>
         <p:nvSpPr>
-          <p:cNvPr id="7" name="Title 6"/>
+          <p:cNvPr id="5" name="Title 4"/>
           <p:cNvSpPr>
             <a:spLocks noGrp="1"/>
           </p:cNvSpPr>
@@ -19422,27 +19285,196 @@
             <p:ph type="title"/>
           </p:nvPr>
         </p:nvSpPr>
+        <p:spPr/>
+        <p:txBody>
+          <a:bodyPr/>
+          <a:lstStyle/>
+          <a:p>
+            <a:r>
+              <a:rPr lang="en-US" dirty="0"/>
+              <a:t>DOM Scripting</a:t>
+            </a:r>
+            <a:endParaRPr lang="nl-NL" dirty="0"/>
+          </a:p>
+        </p:txBody>
+      </p:sp>
+      <p:sp>
+        <p:nvSpPr>
+          <p:cNvPr id="2" name="Text Placeholder 1"/>
+          <p:cNvSpPr>
+            <a:spLocks noGrp="1"/>
+          </p:cNvSpPr>
+          <p:nvPr>
+            <p:ph type="body" sz="quarter" idx="11"/>
+          </p:nvPr>
+        </p:nvSpPr>
+        <p:spPr/>
+        <p:txBody>
+          <a:bodyPr/>
+          <a:lstStyle/>
+          <a:p>
+            <a:r>
+              <a:rPr lang="en-US" dirty="0"/>
+              <a:t>DOM HTML examples: Checkbox and Radio Buttons</a:t>
+            </a:r>
+          </a:p>
+        </p:txBody>
+      </p:sp>
+      <p:sp>
+        <p:nvSpPr>
+          <p:cNvPr id="8" name="Text Placeholder 6"/>
+          <p:cNvSpPr>
+            <a:spLocks noGrp="1"/>
+          </p:cNvSpPr>
+          <p:nvPr>
+            <p:ph type="body" sz="quarter" idx="14"/>
+          </p:nvPr>
+        </p:nvSpPr>
         <p:spPr>
           <a:xfrm>
-            <a:off x="1919536" y="2619189"/>
-            <a:ext cx="8352928" cy="1619622"/>
+            <a:off x="335360" y="1628800"/>
+            <a:ext cx="9649072" cy="4679950"/>
           </a:xfrm>
         </p:spPr>
         <p:txBody>
-          <a:bodyPr/>
+          <a:bodyPr>
+            <a:noAutofit/>
+          </a:bodyPr>
           <a:lstStyle/>
           <a:p>
-            <a:pPr algn="ctr"/>
-            <a:r>
-              <a:rPr lang="en-US" dirty="0"/>
-              <a:t>Lab 10</a:t>
-            </a:r>
-            <a:br>
-              <a:rPr lang="en-US" dirty="0"/>
-            </a:br>
-            <a:r>
-              <a:rPr lang="en-US" dirty="0"/>
-              <a:t>The Task List Application</a:t>
+            <a:r>
+              <a:rPr lang="en-US" sz="1600" b="1" dirty="0"/>
+              <a:t>Get all checked checkboxes in a page and display their values</a:t>
+            </a:r>
+          </a:p>
+          <a:p>
+            <a:endParaRPr lang="en-US" sz="1600" b="1" dirty="0">
+              <a:latin typeface="Courier New" panose="02070309020205020404" pitchFamily="49" charset="0"/>
+              <a:cs typeface="Courier New" panose="02070309020205020404" pitchFamily="49" charset="0"/>
+            </a:endParaRPr>
+          </a:p>
+          <a:p>
+            <a:r>
+              <a:rPr lang="en-US" sz="1600" dirty="0">
+                <a:latin typeface="Courier New" panose="02070309020205020404" pitchFamily="49" charset="0"/>
+                <a:cs typeface="Courier New" panose="02070309020205020404" pitchFamily="49" charset="0"/>
+              </a:rPr>
+              <a:t>let product = </a:t>
+            </a:r>
+            <a:r>
+              <a:rPr lang="en-US" sz="1600" dirty="0" err="1">
+                <a:latin typeface="Courier New" panose="02070309020205020404" pitchFamily="49" charset="0"/>
+                <a:cs typeface="Courier New" panose="02070309020205020404" pitchFamily="49" charset="0"/>
+              </a:rPr>
+              <a:t>document.</a:t>
+            </a:r>
+            <a:r>
+              <a:rPr lang="en-US" sz="1600" b="1" dirty="0" err="1">
+                <a:latin typeface="Courier New" panose="02070309020205020404" pitchFamily="49" charset="0"/>
+                <a:cs typeface="Courier New" panose="02070309020205020404" pitchFamily="49" charset="0"/>
+              </a:rPr>
+              <a:t>getElementsByName</a:t>
+            </a:r>
+            <a:r>
+              <a:rPr lang="en-US" sz="1600" b="1" dirty="0">
+                <a:latin typeface="Courier New" panose="02070309020205020404" pitchFamily="49" charset="0"/>
+                <a:cs typeface="Courier New" panose="02070309020205020404" pitchFamily="49" charset="0"/>
+              </a:rPr>
+              <a:t>('product')</a:t>
+            </a:r>
+            <a:r>
+              <a:rPr lang="en-US" sz="1600" dirty="0">
+                <a:latin typeface="Courier New" panose="02070309020205020404" pitchFamily="49" charset="0"/>
+                <a:cs typeface="Courier New" panose="02070309020205020404" pitchFamily="49" charset="0"/>
+              </a:rPr>
+              <a:t>;</a:t>
+            </a:r>
+          </a:p>
+          <a:p>
+            <a:r>
+              <a:rPr lang="en-US" sz="1600" dirty="0">
+                <a:latin typeface="Courier New" panose="02070309020205020404" pitchFamily="49" charset="0"/>
+                <a:cs typeface="Courier New" panose="02070309020205020404" pitchFamily="49" charset="0"/>
+              </a:rPr>
+              <a:t>for (let i = 0; i &lt; </a:t>
+            </a:r>
+            <a:r>
+              <a:rPr lang="en-US" sz="1600" dirty="0" err="1">
+                <a:latin typeface="Courier New" panose="02070309020205020404" pitchFamily="49" charset="0"/>
+                <a:cs typeface="Courier New" panose="02070309020205020404" pitchFamily="49" charset="0"/>
+              </a:rPr>
+              <a:t>product.length</a:t>
+            </a:r>
+            <a:r>
+              <a:rPr lang="en-US" sz="1600" dirty="0">
+                <a:latin typeface="Courier New" panose="02070309020205020404" pitchFamily="49" charset="0"/>
+                <a:cs typeface="Courier New" panose="02070309020205020404" pitchFamily="49" charset="0"/>
+              </a:rPr>
+              <a:t>; i++) {</a:t>
+            </a:r>
+          </a:p>
+          <a:p>
+            <a:r>
+              <a:rPr lang="en-US" sz="1600" dirty="0">
+                <a:latin typeface="Courier New" panose="02070309020205020404" pitchFamily="49" charset="0"/>
+                <a:cs typeface="Courier New" panose="02070309020205020404" pitchFamily="49" charset="0"/>
+              </a:rPr>
+              <a:t>	if (product[i].</a:t>
+            </a:r>
+            <a:r>
+              <a:rPr lang="en-US" sz="1600" b="1" dirty="0">
+                <a:latin typeface="Courier New" panose="02070309020205020404" pitchFamily="49" charset="0"/>
+                <a:cs typeface="Courier New" panose="02070309020205020404" pitchFamily="49" charset="0"/>
+              </a:rPr>
+              <a:t>checked</a:t>
+            </a:r>
+            <a:r>
+              <a:rPr lang="en-US" sz="1600" dirty="0">
+                <a:latin typeface="Courier New" panose="02070309020205020404" pitchFamily="49" charset="0"/>
+                <a:cs typeface="Courier New" panose="02070309020205020404" pitchFamily="49" charset="0"/>
+              </a:rPr>
+              <a:t>) {</a:t>
+            </a:r>
+          </a:p>
+          <a:p>
+            <a:r>
+              <a:rPr lang="en-US" sz="1600" dirty="0">
+                <a:latin typeface="Courier New" panose="02070309020205020404" pitchFamily="49" charset="0"/>
+                <a:cs typeface="Courier New" panose="02070309020205020404" pitchFamily="49" charset="0"/>
+              </a:rPr>
+              <a:t>		console.log(product[i].</a:t>
+            </a:r>
+            <a:r>
+              <a:rPr lang="en-US" sz="1600" b="1" dirty="0">
+                <a:latin typeface="Courier New" panose="02070309020205020404" pitchFamily="49" charset="0"/>
+                <a:cs typeface="Courier New" panose="02070309020205020404" pitchFamily="49" charset="0"/>
+              </a:rPr>
+              <a:t>value</a:t>
+            </a:r>
+            <a:r>
+              <a:rPr lang="en-US" sz="1600" dirty="0">
+                <a:latin typeface="Courier New" panose="02070309020205020404" pitchFamily="49" charset="0"/>
+                <a:cs typeface="Courier New" panose="02070309020205020404" pitchFamily="49" charset="0"/>
+              </a:rPr>
+              <a:t>);</a:t>
+            </a:r>
+          </a:p>
+          <a:p>
+            <a:r>
+              <a:rPr lang="en-US" sz="1600" dirty="0">
+                <a:latin typeface="Courier New" panose="02070309020205020404" pitchFamily="49" charset="0"/>
+                <a:cs typeface="Courier New" panose="02070309020205020404" pitchFamily="49" charset="0"/>
+              </a:rPr>
+              <a:t>	}</a:t>
+            </a:r>
+          </a:p>
+          <a:p>
+            <a:r>
+              <a:rPr lang="en-US" sz="1600" dirty="0">
+                <a:latin typeface="Courier New" panose="02070309020205020404" pitchFamily="49" charset="0"/>
+                <a:cs typeface="Courier New" panose="02070309020205020404" pitchFamily="49" charset="0"/>
+              </a:rPr>
+              <a:t>}</a:t>
             </a:r>
           </a:p>
         </p:txBody>
@@ -19450,7 +19482,7 @@
     </p:spTree>
     <p:extLst>
       <p:ext uri="{BB962C8B-B14F-4D97-AF65-F5344CB8AC3E}">
-        <p14:creationId xmlns:p14="http://schemas.microsoft.com/office/powerpoint/2010/main" val="851443029"/>
+        <p14:creationId xmlns:p14="http://schemas.microsoft.com/office/powerpoint/2010/main" val="980239286"/>
       </p:ext>
     </p:extLst>
   </p:cSld>
@@ -19500,6 +19532,71 @@
             <a:pPr algn="ctr"/>
             <a:r>
               <a:rPr lang="en-US" dirty="0"/>
+              <a:t>Lab 10</a:t>
+            </a:r>
+            <a:br>
+              <a:rPr lang="en-US" dirty="0"/>
+            </a:br>
+            <a:r>
+              <a:rPr lang="en-US" dirty="0"/>
+              <a:t>The Task List Application</a:t>
+            </a:r>
+          </a:p>
+        </p:txBody>
+      </p:sp>
+    </p:spTree>
+    <p:extLst>
+      <p:ext uri="{BB962C8B-B14F-4D97-AF65-F5344CB8AC3E}">
+        <p14:creationId xmlns:p14="http://schemas.microsoft.com/office/powerpoint/2010/main" val="851443029"/>
+      </p:ext>
+    </p:extLst>
+  </p:cSld>
+  <p:clrMapOvr>
+    <a:masterClrMapping/>
+  </p:clrMapOvr>
+</p:sld>
+</file>
+
+<file path=ppt/slides/slide57.xml><?xml version="1.0" encoding="utf-8"?>
+<p:sld xmlns:a="http://schemas.openxmlformats.org/drawingml/2006/main" xmlns:r="http://schemas.openxmlformats.org/officeDocument/2006/relationships" xmlns:p="http://schemas.openxmlformats.org/presentationml/2006/main">
+  <p:cSld>
+    <p:spTree>
+      <p:nvGrpSpPr>
+        <p:cNvPr id="1" name=""/>
+        <p:cNvGrpSpPr/>
+        <p:nvPr/>
+      </p:nvGrpSpPr>
+      <p:grpSpPr>
+        <a:xfrm>
+          <a:off x="0" y="0"/>
+          <a:ext cx="0" cy="0"/>
+          <a:chOff x="0" y="0"/>
+          <a:chExt cx="0" cy="0"/>
+        </a:xfrm>
+      </p:grpSpPr>
+      <p:sp>
+        <p:nvSpPr>
+          <p:cNvPr id="7" name="Title 6"/>
+          <p:cNvSpPr>
+            <a:spLocks noGrp="1"/>
+          </p:cNvSpPr>
+          <p:nvPr>
+            <p:ph type="title"/>
+          </p:nvPr>
+        </p:nvSpPr>
+        <p:spPr>
+          <a:xfrm>
+            <a:off x="1919536" y="2619189"/>
+            <a:ext cx="8352928" cy="1619622"/>
+          </a:xfrm>
+        </p:spPr>
+        <p:txBody>
+          <a:bodyPr/>
+          <a:lstStyle/>
+          <a:p>
+            <a:pPr algn="ctr"/>
+            <a:r>
+              <a:rPr lang="en-US" dirty="0"/>
               <a:t>Lab 11</a:t>
             </a:r>
             <a:br>
@@ -19525,7 +19622,7 @@
 </p:sld>
 </file>
 
-<file path=ppt/slides/slide57.xml><?xml version="1.0" encoding="utf-8"?>
+<file path=ppt/slides/slide58.xml><?xml version="1.0" encoding="utf-8"?>
 <p:sld xmlns:a="http://schemas.openxmlformats.org/drawingml/2006/main" xmlns:r="http://schemas.openxmlformats.org/officeDocument/2006/relationships" xmlns:p="http://schemas.openxmlformats.org/presentationml/2006/main">
   <p:cSld>
     <p:spTree>

</xml_diff>